<commit_message>
Bilder geändert || Baseline hinzugefügt
Bilder zu Bilder höherer Auflösung geändert, Text ggf. auf Deutsch übersetzt.
Baseline komplett beschrieben
</commit_message>
<xml_diff>
--- a/pictures/Inception.pptx
+++ b/pictures/Inception.pptx
@@ -11,6 +11,7 @@
     <p:sldId id="259" r:id="rId5"/>
     <p:sldId id="260" r:id="rId6"/>
     <p:sldId id="261" r:id="rId7"/>
+    <p:sldId id="262" r:id="rId8"/>
   </p:sldIdLst>
   <p:sldSz cx="12192000" cy="6858000"/>
   <p:notesSz cx="6858000" cy="9144000"/>
@@ -264,7 +265,7 @@
           <a:p>
             <a:fld id="{5C0FA588-66A6-42B4-90CC-928B49E780E9}" type="datetimeFigureOut">
               <a:rPr lang="de-DE" smtClean="0"/>
-              <a:t>18.03.2019</a:t>
+              <a:t>02.04.2019</a:t>
             </a:fld>
             <a:endParaRPr lang="de-DE"/>
           </a:p>
@@ -462,7 +463,7 @@
           <a:p>
             <a:fld id="{5C0FA588-66A6-42B4-90CC-928B49E780E9}" type="datetimeFigureOut">
               <a:rPr lang="de-DE" smtClean="0"/>
-              <a:t>18.03.2019</a:t>
+              <a:t>02.04.2019</a:t>
             </a:fld>
             <a:endParaRPr lang="de-DE"/>
           </a:p>
@@ -670,7 +671,7 @@
           <a:p>
             <a:fld id="{5C0FA588-66A6-42B4-90CC-928B49E780E9}" type="datetimeFigureOut">
               <a:rPr lang="de-DE" smtClean="0"/>
-              <a:t>18.03.2019</a:t>
+              <a:t>02.04.2019</a:t>
             </a:fld>
             <a:endParaRPr lang="de-DE"/>
           </a:p>
@@ -868,7 +869,7 @@
           <a:p>
             <a:fld id="{5C0FA588-66A6-42B4-90CC-928B49E780E9}" type="datetimeFigureOut">
               <a:rPr lang="de-DE" smtClean="0"/>
-              <a:t>18.03.2019</a:t>
+              <a:t>02.04.2019</a:t>
             </a:fld>
             <a:endParaRPr lang="de-DE"/>
           </a:p>
@@ -1143,7 +1144,7 @@
           <a:p>
             <a:fld id="{5C0FA588-66A6-42B4-90CC-928B49E780E9}" type="datetimeFigureOut">
               <a:rPr lang="de-DE" smtClean="0"/>
-              <a:t>18.03.2019</a:t>
+              <a:t>02.04.2019</a:t>
             </a:fld>
             <a:endParaRPr lang="de-DE"/>
           </a:p>
@@ -1408,7 +1409,7 @@
           <a:p>
             <a:fld id="{5C0FA588-66A6-42B4-90CC-928B49E780E9}" type="datetimeFigureOut">
               <a:rPr lang="de-DE" smtClean="0"/>
-              <a:t>18.03.2019</a:t>
+              <a:t>02.04.2019</a:t>
             </a:fld>
             <a:endParaRPr lang="de-DE"/>
           </a:p>
@@ -1820,7 +1821,7 @@
           <a:p>
             <a:fld id="{5C0FA588-66A6-42B4-90CC-928B49E780E9}" type="datetimeFigureOut">
               <a:rPr lang="de-DE" smtClean="0"/>
-              <a:t>18.03.2019</a:t>
+              <a:t>02.04.2019</a:t>
             </a:fld>
             <a:endParaRPr lang="de-DE"/>
           </a:p>
@@ -1961,7 +1962,7 @@
           <a:p>
             <a:fld id="{5C0FA588-66A6-42B4-90CC-928B49E780E9}" type="datetimeFigureOut">
               <a:rPr lang="de-DE" smtClean="0"/>
-              <a:t>18.03.2019</a:t>
+              <a:t>02.04.2019</a:t>
             </a:fld>
             <a:endParaRPr lang="de-DE"/>
           </a:p>
@@ -2074,7 +2075,7 @@
           <a:p>
             <a:fld id="{5C0FA588-66A6-42B4-90CC-928B49E780E9}" type="datetimeFigureOut">
               <a:rPr lang="de-DE" smtClean="0"/>
-              <a:t>18.03.2019</a:t>
+              <a:t>02.04.2019</a:t>
             </a:fld>
             <a:endParaRPr lang="de-DE"/>
           </a:p>
@@ -2385,7 +2386,7 @@
           <a:p>
             <a:fld id="{5C0FA588-66A6-42B4-90CC-928B49E780E9}" type="datetimeFigureOut">
               <a:rPr lang="de-DE" smtClean="0"/>
-              <a:t>18.03.2019</a:t>
+              <a:t>02.04.2019</a:t>
             </a:fld>
             <a:endParaRPr lang="de-DE"/>
           </a:p>
@@ -2673,7 +2674,7 @@
           <a:p>
             <a:fld id="{5C0FA588-66A6-42B4-90CC-928B49E780E9}" type="datetimeFigureOut">
               <a:rPr lang="de-DE" smtClean="0"/>
-              <a:t>18.03.2019</a:t>
+              <a:t>02.04.2019</a:t>
             </a:fld>
             <a:endParaRPr lang="de-DE"/>
           </a:p>
@@ -2914,7 +2915,7 @@
           <a:p>
             <a:fld id="{5C0FA588-66A6-42B4-90CC-928B49E780E9}" type="datetimeFigureOut">
               <a:rPr lang="de-DE" smtClean="0"/>
-              <a:t>18.03.2019</a:t>
+              <a:t>02.04.2019</a:t>
             </a:fld>
             <a:endParaRPr lang="de-DE"/>
           </a:p>
@@ -3996,7 +3997,7 @@
         </p:nvSpPr>
         <p:spPr>
           <a:xfrm>
-            <a:off x="2928971" y="2158448"/>
+            <a:off x="2937488" y="2158448"/>
             <a:ext cx="864339" cy="215444"/>
           </a:xfrm>
           <a:prstGeom prst="rect">
@@ -4144,12 +4145,47 @@
           </a:p>
         </p:txBody>
       </p:sp>
+      <p:sp>
+        <p:nvSpPr>
+          <p:cNvPr id="90" name="Textfeld 89">
+            <a:extLst>
+              <a:ext uri="{FF2B5EF4-FFF2-40B4-BE49-F238E27FC236}">
+                <a16:creationId xmlns:a16="http://schemas.microsoft.com/office/drawing/2014/main" id="{F97F6C5B-2DDA-44D9-BECF-395661DEFF2D}"/>
+              </a:ext>
+            </a:extLst>
+          </p:cNvPr>
+          <p:cNvSpPr txBox="1"/>
+          <p:nvPr/>
+        </p:nvSpPr>
+        <p:spPr>
+          <a:xfrm>
+            <a:off x="1489879" y="3362642"/>
+            <a:ext cx="813042" cy="215444"/>
+          </a:xfrm>
+          <a:prstGeom prst="rect">
+            <a:avLst/>
+          </a:prstGeom>
+          <a:noFill/>
+        </p:spPr>
+        <p:txBody>
+          <a:bodyPr wrap="square" rtlCol="0">
+            <a:spAutoFit/>
+          </a:bodyPr>
+          <a:lstStyle/>
+          <a:p>
+            <a:r>
+              <a:rPr lang="de-DE" sz="800" dirty="0"/>
+              <a:t>8 x 8 x 8 x 384</a:t>
+            </a:r>
+          </a:p>
+        </p:txBody>
+      </p:sp>
       <p:cxnSp>
         <p:nvCxnSpPr>
-          <p:cNvPr id="87" name="Verbinder: gekrümmt 86">
-            <a:extLst>
-              <a:ext uri="{FF2B5EF4-FFF2-40B4-BE49-F238E27FC236}">
-                <a16:creationId xmlns:a16="http://schemas.microsoft.com/office/drawing/2014/main" id="{D84B7712-5561-479F-B02B-7F048234EBBB}"/>
+          <p:cNvPr id="93" name="Verbinder: gekrümmt 92">
+            <a:extLst>
+              <a:ext uri="{FF2B5EF4-FFF2-40B4-BE49-F238E27FC236}">
+                <a16:creationId xmlns:a16="http://schemas.microsoft.com/office/drawing/2014/main" id="{77E93DF6-DB5F-4105-BAAD-6715AFAE02D2}"/>
               </a:ext>
             </a:extLst>
           </p:cNvPr>
@@ -4159,8 +4195,86 @@
           <p:nvPr/>
         </p:nvCxnSpPr>
         <p:spPr>
+          <a:xfrm rot="5400000" flipH="1" flipV="1">
+            <a:off x="4173263" y="-26462"/>
+            <a:ext cx="12700" cy="1546910"/>
+          </a:xfrm>
+          <a:prstGeom prst="curvedConnector3">
+            <a:avLst>
+              <a:gd name="adj1" fmla="val 3600000"/>
+            </a:avLst>
+          </a:prstGeom>
+          <a:ln>
+            <a:tailEnd type="triangle"/>
+          </a:ln>
+        </p:spPr>
+        <p:style>
+          <a:lnRef idx="1">
+            <a:schemeClr val="accent1"/>
+          </a:lnRef>
+          <a:fillRef idx="0">
+            <a:schemeClr val="accent1"/>
+          </a:fillRef>
+          <a:effectRef idx="0">
+            <a:schemeClr val="accent1"/>
+          </a:effectRef>
+          <a:fontRef idx="minor">
+            <a:schemeClr val="tx1"/>
+          </a:fontRef>
+        </p:style>
+      </p:cxnSp>
+      <p:sp>
+        <p:nvSpPr>
+          <p:cNvPr id="97" name="Textfeld 96">
+            <a:extLst>
+              <a:ext uri="{FF2B5EF4-FFF2-40B4-BE49-F238E27FC236}">
+                <a16:creationId xmlns:a16="http://schemas.microsoft.com/office/drawing/2014/main" id="{043C055D-2466-4AA9-A977-40F3BA968616}"/>
+              </a:ext>
+            </a:extLst>
+          </p:cNvPr>
+          <p:cNvSpPr txBox="1"/>
+          <p:nvPr/>
+        </p:nvSpPr>
+        <p:spPr>
+          <a:xfrm>
+            <a:off x="3891896" y="370064"/>
+            <a:ext cx="538930" cy="215444"/>
+          </a:xfrm>
+          <a:prstGeom prst="rect">
+            <a:avLst/>
+          </a:prstGeom>
+          <a:noFill/>
+        </p:spPr>
+        <p:txBody>
+          <a:bodyPr wrap="none" rtlCol="0">
+            <a:spAutoFit/>
+          </a:bodyPr>
+          <a:lstStyle/>
+          <a:p>
+            <a:r>
+              <a:rPr lang="de-DE" sz="800" dirty="0"/>
+              <a:t>Residual</a:t>
+            </a:r>
+          </a:p>
+        </p:txBody>
+      </p:sp>
+      <p:cxnSp>
+        <p:nvCxnSpPr>
+          <p:cNvPr id="129" name="Verbinder: gekrümmt 128">
+            <a:extLst>
+              <a:ext uri="{FF2B5EF4-FFF2-40B4-BE49-F238E27FC236}">
+                <a16:creationId xmlns:a16="http://schemas.microsoft.com/office/drawing/2014/main" id="{BBA218B5-E83E-4CB3-9EF4-2EE946CAF7DD}"/>
+              </a:ext>
+            </a:extLst>
+          </p:cNvPr>
+          <p:cNvCxnSpPr>
+            <a:cxnSpLocks/>
+          </p:cNvCxnSpPr>
+          <p:nvPr/>
+        </p:nvCxnSpPr>
+        <p:spPr>
           <a:xfrm rot="16200000" flipH="1">
-            <a:off x="5682013" y="1632366"/>
+            <a:off x="2581335" y="1600525"/>
             <a:ext cx="12700" cy="1546910"/>
           </a:xfrm>
           <a:prstGeom prst="curvedConnector3">
@@ -4189,10 +4303,10 @@
       </p:cxnSp>
       <p:sp>
         <p:nvSpPr>
-          <p:cNvPr id="88" name="Textfeld 87">
-            <a:extLst>
-              <a:ext uri="{FF2B5EF4-FFF2-40B4-BE49-F238E27FC236}">
-                <a16:creationId xmlns:a16="http://schemas.microsoft.com/office/drawing/2014/main" id="{87F4F8B8-84E8-4D37-ABF4-3248E30AA1D1}"/>
+          <p:cNvPr id="130" name="Textfeld 129">
+            <a:extLst>
+              <a:ext uri="{FF2B5EF4-FFF2-40B4-BE49-F238E27FC236}">
+                <a16:creationId xmlns:a16="http://schemas.microsoft.com/office/drawing/2014/main" id="{0E39983D-D3E3-4BBC-9C65-C235C4F041F2}"/>
               </a:ext>
             </a:extLst>
           </p:cNvPr>
@@ -4201,7 +4315,7 @@
         </p:nvSpPr>
         <p:spPr>
           <a:xfrm>
-            <a:off x="5445701" y="2584719"/>
+            <a:off x="2346333" y="2532162"/>
             <a:ext cx="538930" cy="215444"/>
           </a:xfrm>
           <a:prstGeom prst="rect">
@@ -4224,262 +4338,27 @@
       </p:sp>
       <p:sp>
         <p:nvSpPr>
-          <p:cNvPr id="90" name="Textfeld 89">
-            <a:extLst>
-              <a:ext uri="{FF2B5EF4-FFF2-40B4-BE49-F238E27FC236}">
-                <a16:creationId xmlns:a16="http://schemas.microsoft.com/office/drawing/2014/main" id="{F97F6C5B-2DDA-44D9-BECF-395661DEFF2D}"/>
-              </a:ext>
-            </a:extLst>
-          </p:cNvPr>
-          <p:cNvSpPr txBox="1"/>
-          <p:nvPr/>
-        </p:nvSpPr>
-        <p:spPr>
-          <a:xfrm>
-            <a:off x="6064955" y="2163770"/>
-            <a:ext cx="813042" cy="215444"/>
+          <p:cNvPr id="139" name="Rechteck 138">
+            <a:extLst>
+              <a:ext uri="{FF2B5EF4-FFF2-40B4-BE49-F238E27FC236}">
+                <a16:creationId xmlns:a16="http://schemas.microsoft.com/office/drawing/2014/main" id="{1FD8C86E-AFE9-4AE2-AFC4-22A9D0A060A8}"/>
+              </a:ext>
+            </a:extLst>
+          </p:cNvPr>
+          <p:cNvSpPr/>
+          <p:nvPr/>
+        </p:nvSpPr>
+        <p:spPr>
+          <a:xfrm>
+            <a:off x="2242462" y="3096040"/>
+            <a:ext cx="746672" cy="482048"/>
           </a:xfrm>
           <a:prstGeom prst="rect">
             <a:avLst/>
           </a:prstGeom>
-          <a:noFill/>
-        </p:spPr>
-        <p:txBody>
-          <a:bodyPr wrap="square" rtlCol="0">
-            <a:spAutoFit/>
-          </a:bodyPr>
-          <a:lstStyle/>
-          <a:p>
-            <a:r>
-              <a:rPr lang="de-DE" sz="800" dirty="0"/>
-              <a:t>8 x 8 x 8 x 384</a:t>
-            </a:r>
-          </a:p>
-        </p:txBody>
-      </p:sp>
-      <p:cxnSp>
-        <p:nvCxnSpPr>
-          <p:cNvPr id="93" name="Verbinder: gekrümmt 92">
-            <a:extLst>
-              <a:ext uri="{FF2B5EF4-FFF2-40B4-BE49-F238E27FC236}">
-                <a16:creationId xmlns:a16="http://schemas.microsoft.com/office/drawing/2014/main" id="{77E93DF6-DB5F-4105-BAAD-6715AFAE02D2}"/>
-              </a:ext>
-            </a:extLst>
-          </p:cNvPr>
-          <p:cNvCxnSpPr>
-            <a:cxnSpLocks/>
-          </p:cNvCxnSpPr>
-          <p:nvPr/>
-        </p:nvCxnSpPr>
-        <p:spPr>
-          <a:xfrm rot="5400000" flipH="1" flipV="1">
-            <a:off x="4173263" y="-26462"/>
-            <a:ext cx="12700" cy="1546910"/>
-          </a:xfrm>
-          <a:prstGeom prst="curvedConnector3">
-            <a:avLst>
-              <a:gd name="adj1" fmla="val 3600000"/>
-            </a:avLst>
-          </a:prstGeom>
-          <a:ln>
-            <a:tailEnd type="triangle"/>
-          </a:ln>
-        </p:spPr>
-        <p:style>
-          <a:lnRef idx="1">
-            <a:schemeClr val="accent1"/>
-          </a:lnRef>
-          <a:fillRef idx="0">
-            <a:schemeClr val="accent1"/>
-          </a:fillRef>
-          <a:effectRef idx="0">
-            <a:schemeClr val="accent1"/>
-          </a:effectRef>
-          <a:fontRef idx="minor">
-            <a:schemeClr val="tx1"/>
-          </a:fontRef>
-        </p:style>
-      </p:cxnSp>
-      <p:sp>
-        <p:nvSpPr>
-          <p:cNvPr id="97" name="Textfeld 96">
-            <a:extLst>
-              <a:ext uri="{FF2B5EF4-FFF2-40B4-BE49-F238E27FC236}">
-                <a16:creationId xmlns:a16="http://schemas.microsoft.com/office/drawing/2014/main" id="{043C055D-2466-4AA9-A977-40F3BA968616}"/>
-              </a:ext>
-            </a:extLst>
-          </p:cNvPr>
-          <p:cNvSpPr txBox="1"/>
-          <p:nvPr/>
-        </p:nvSpPr>
-        <p:spPr>
-          <a:xfrm>
-            <a:off x="3891896" y="370064"/>
-            <a:ext cx="538930" cy="215444"/>
-          </a:xfrm>
-          <a:prstGeom prst="rect">
-            <a:avLst/>
-          </a:prstGeom>
-          <a:noFill/>
-        </p:spPr>
-        <p:txBody>
-          <a:bodyPr wrap="none" rtlCol="0">
-            <a:spAutoFit/>
-          </a:bodyPr>
-          <a:lstStyle/>
-          <a:p>
-            <a:r>
-              <a:rPr lang="de-DE" sz="800" dirty="0"/>
-              <a:t>Residual</a:t>
-            </a:r>
-          </a:p>
-        </p:txBody>
-      </p:sp>
-      <p:cxnSp>
-        <p:nvCxnSpPr>
-          <p:cNvPr id="102" name="Verbinder: gewinkelt 101">
-            <a:extLst>
-              <a:ext uri="{FF2B5EF4-FFF2-40B4-BE49-F238E27FC236}">
-                <a16:creationId xmlns:a16="http://schemas.microsoft.com/office/drawing/2014/main" id="{D881C675-91B6-44EF-A052-BA0617120070}"/>
-              </a:ext>
-            </a:extLst>
-          </p:cNvPr>
-          <p:cNvCxnSpPr>
-            <a:cxnSpLocks/>
-            <a:stCxn id="21" idx="3"/>
-            <a:endCxn id="30" idx="1"/>
-          </p:cNvCxnSpPr>
-          <p:nvPr/>
-        </p:nvCxnSpPr>
-        <p:spPr>
-          <a:xfrm flipH="1">
-            <a:off x="2242464" y="988019"/>
-            <a:ext cx="3841870" cy="1126531"/>
-          </a:xfrm>
-          <a:prstGeom prst="bentConnector5">
-            <a:avLst>
-              <a:gd name="adj1" fmla="val -5950"/>
-              <a:gd name="adj2" fmla="val 50000"/>
-              <a:gd name="adj3" fmla="val 120696"/>
-            </a:avLst>
-          </a:prstGeom>
-          <a:ln>
-            <a:tailEnd type="triangle"/>
-          </a:ln>
-        </p:spPr>
-        <p:style>
-          <a:lnRef idx="1">
-            <a:schemeClr val="accent1"/>
-          </a:lnRef>
-          <a:fillRef idx="0">
-            <a:schemeClr val="accent1"/>
-          </a:fillRef>
-          <a:effectRef idx="0">
-            <a:schemeClr val="accent1"/>
-          </a:effectRef>
-          <a:fontRef idx="minor">
-            <a:schemeClr val="tx1"/>
-          </a:fontRef>
-        </p:style>
-      </p:cxnSp>
-      <p:cxnSp>
-        <p:nvCxnSpPr>
-          <p:cNvPr id="129" name="Verbinder: gekrümmt 128">
-            <a:extLst>
-              <a:ext uri="{FF2B5EF4-FFF2-40B4-BE49-F238E27FC236}">
-                <a16:creationId xmlns:a16="http://schemas.microsoft.com/office/drawing/2014/main" id="{BBA218B5-E83E-4CB3-9EF4-2EE946CAF7DD}"/>
-              </a:ext>
-            </a:extLst>
-          </p:cNvPr>
-          <p:cNvCxnSpPr>
-            <a:cxnSpLocks/>
-          </p:cNvCxnSpPr>
-          <p:nvPr/>
-        </p:nvCxnSpPr>
-        <p:spPr>
-          <a:xfrm rot="16200000" flipH="1">
-            <a:off x="2626353" y="1644245"/>
-            <a:ext cx="12700" cy="1546910"/>
-          </a:xfrm>
-          <a:prstGeom prst="curvedConnector3">
-            <a:avLst>
-              <a:gd name="adj1" fmla="val 3834787"/>
-            </a:avLst>
-          </a:prstGeom>
-          <a:ln>
-            <a:tailEnd type="triangle"/>
-          </a:ln>
-        </p:spPr>
-        <p:style>
-          <a:lnRef idx="1">
-            <a:schemeClr val="accent1"/>
-          </a:lnRef>
-          <a:fillRef idx="0">
-            <a:schemeClr val="accent1"/>
-          </a:fillRef>
-          <a:effectRef idx="0">
-            <a:schemeClr val="accent1"/>
-          </a:effectRef>
-          <a:fontRef idx="minor">
-            <a:schemeClr val="tx1"/>
-          </a:fontRef>
-        </p:style>
-      </p:cxnSp>
-      <p:sp>
-        <p:nvSpPr>
-          <p:cNvPr id="130" name="Textfeld 129">
-            <a:extLst>
-              <a:ext uri="{FF2B5EF4-FFF2-40B4-BE49-F238E27FC236}">
-                <a16:creationId xmlns:a16="http://schemas.microsoft.com/office/drawing/2014/main" id="{0E39983D-D3E3-4BBC-9C65-C235C4F041F2}"/>
-              </a:ext>
-            </a:extLst>
-          </p:cNvPr>
-          <p:cNvSpPr txBox="1"/>
-          <p:nvPr/>
-        </p:nvSpPr>
-        <p:spPr>
-          <a:xfrm>
-            <a:off x="2390041" y="2596598"/>
-            <a:ext cx="538930" cy="215444"/>
-          </a:xfrm>
-          <a:prstGeom prst="rect">
-            <a:avLst/>
-          </a:prstGeom>
-          <a:noFill/>
-        </p:spPr>
-        <p:txBody>
-          <a:bodyPr wrap="none" rtlCol="0">
-            <a:spAutoFit/>
-          </a:bodyPr>
-          <a:lstStyle/>
-          <a:p>
-            <a:r>
-              <a:rPr lang="de-DE" sz="800" dirty="0"/>
-              <a:t>Residual</a:t>
-            </a:r>
-          </a:p>
-        </p:txBody>
-      </p:sp>
-      <p:sp>
-        <p:nvSpPr>
-          <p:cNvPr id="139" name="Rechteck 138">
-            <a:extLst>
-              <a:ext uri="{FF2B5EF4-FFF2-40B4-BE49-F238E27FC236}">
-                <a16:creationId xmlns:a16="http://schemas.microsoft.com/office/drawing/2014/main" id="{1FD8C86E-AFE9-4AE2-AFC4-22A9D0A060A8}"/>
-              </a:ext>
-            </a:extLst>
-          </p:cNvPr>
-          <p:cNvSpPr/>
-          <p:nvPr/>
-        </p:nvSpPr>
-        <p:spPr>
-          <a:xfrm>
-            <a:off x="6883226" y="1863587"/>
-            <a:ext cx="746672" cy="482048"/>
-          </a:xfrm>
-          <a:prstGeom prst="rect">
-            <a:avLst/>
-          </a:prstGeom>
+          <a:solidFill>
+            <a:srgbClr val="00B050"/>
+          </a:solidFill>
         </p:spPr>
         <p:style>
           <a:lnRef idx="2">
@@ -4516,49 +4395,6 @@
           </a:p>
         </p:txBody>
       </p:sp>
-      <p:cxnSp>
-        <p:nvCxnSpPr>
-          <p:cNvPr id="142" name="Gerade Verbindung mit Pfeil 141">
-            <a:extLst>
-              <a:ext uri="{FF2B5EF4-FFF2-40B4-BE49-F238E27FC236}">
-                <a16:creationId xmlns:a16="http://schemas.microsoft.com/office/drawing/2014/main" id="{CFB6909D-1E2A-416D-BFDF-6C67A34D2061}"/>
-              </a:ext>
-            </a:extLst>
-          </p:cNvPr>
-          <p:cNvCxnSpPr>
-            <a:cxnSpLocks/>
-            <a:stCxn id="70" idx="3"/>
-            <a:endCxn id="139" idx="1"/>
-          </p:cNvCxnSpPr>
-          <p:nvPr/>
-        </p:nvCxnSpPr>
-        <p:spPr>
-          <a:xfrm flipV="1">
-            <a:off x="6078966" y="2104611"/>
-            <a:ext cx="804260" cy="9939"/>
-          </a:xfrm>
-          <a:prstGeom prst="straightConnector1">
-            <a:avLst/>
-          </a:prstGeom>
-          <a:ln>
-            <a:tailEnd type="triangle"/>
-          </a:ln>
-        </p:spPr>
-        <p:style>
-          <a:lnRef idx="1">
-            <a:schemeClr val="accent1"/>
-          </a:lnRef>
-          <a:fillRef idx="0">
-            <a:schemeClr val="accent1"/>
-          </a:fillRef>
-          <a:effectRef idx="0">
-            <a:schemeClr val="accent1"/>
-          </a:effectRef>
-          <a:fontRef idx="minor">
-            <a:schemeClr val="tx1"/>
-          </a:fontRef>
-        </p:style>
-      </p:cxnSp>
       <p:sp>
         <p:nvSpPr>
           <p:cNvPr id="144" name="Textfeld 143">
@@ -4573,7 +4409,7 @@
         </p:nvSpPr>
         <p:spPr>
           <a:xfrm>
-            <a:off x="7610519" y="2163770"/>
+            <a:off x="2995781" y="3362776"/>
             <a:ext cx="813042" cy="215444"/>
           </a:xfrm>
           <a:prstGeom prst="rect">
@@ -4608,12 +4444,15 @@
         </p:nvSpPr>
         <p:spPr>
           <a:xfrm>
-            <a:off x="8423561" y="1863587"/>
+            <a:off x="3787378" y="3095578"/>
             <a:ext cx="746672" cy="482048"/>
           </a:xfrm>
           <a:prstGeom prst="rect">
             <a:avLst/>
           </a:prstGeom>
+          <a:solidFill>
+            <a:srgbClr val="00B0F0"/>
+          </a:solidFill>
         </p:spPr>
         <p:style>
           <a:lnRef idx="2">
@@ -4672,9 +4511,9 @@
           <p:nvPr/>
         </p:nvCxnSpPr>
         <p:spPr>
-          <a:xfrm>
-            <a:off x="7629898" y="2104611"/>
-            <a:ext cx="793663" cy="0"/>
+          <a:xfrm flipV="1">
+            <a:off x="2989134" y="3336602"/>
+            <a:ext cx="798244" cy="462"/>
           </a:xfrm>
           <a:prstGeom prst="straightConnector1">
             <a:avLst/>
@@ -4712,7 +4551,7 @@
         </p:nvSpPr>
         <p:spPr>
           <a:xfrm>
-            <a:off x="9315946" y="2158448"/>
+            <a:off x="4654730" y="3362642"/>
             <a:ext cx="501389" cy="215442"/>
           </a:xfrm>
           <a:prstGeom prst="rect">
@@ -4728,13 +4567,8 @@
           <a:p>
             <a:r>
               <a:rPr lang="de-DE" sz="800" dirty="0"/>
-              <a:t>1 </a:t>
-            </a:r>
-            <a:r>
-              <a:rPr lang="de-DE" sz="800"/>
-              <a:t>x 64</a:t>
-            </a:r>
-            <a:endParaRPr lang="de-DE" sz="800" dirty="0"/>
+              <a:t>1 x 64</a:t>
+            </a:r>
           </a:p>
         </p:txBody>
       </p:sp>
@@ -4752,12 +4586,15 @@
         </p:nvSpPr>
         <p:spPr>
           <a:xfrm>
-            <a:off x="9963048" y="1842515"/>
+            <a:off x="5332294" y="3095578"/>
             <a:ext cx="746672" cy="482048"/>
           </a:xfrm>
           <a:prstGeom prst="rect">
             <a:avLst/>
           </a:prstGeom>
+          <a:solidFill>
+            <a:srgbClr val="00B0F0"/>
+          </a:solidFill>
         </p:spPr>
         <p:style>
           <a:lnRef idx="2">
@@ -4811,7 +4648,7 @@
         </p:nvCxnSpPr>
         <p:spPr>
           <a:xfrm>
-            <a:off x="9169385" y="2083539"/>
+            <a:off x="4538631" y="3336602"/>
             <a:ext cx="793663" cy="0"/>
           </a:xfrm>
           <a:prstGeom prst="straightConnector1">
@@ -4853,7 +4690,7 @@
         </p:nvCxnSpPr>
         <p:spPr>
           <a:xfrm>
-            <a:off x="10709720" y="2083539"/>
+            <a:off x="6078966" y="3336602"/>
             <a:ext cx="531437" cy="0"/>
           </a:xfrm>
           <a:prstGeom prst="straightConnector1">
@@ -4894,7 +4731,7 @@
             </p:nvSpPr>
             <p:spPr>
               <a:xfrm>
-                <a:off x="11241157" y="1716643"/>
+                <a:off x="6731083" y="2969706"/>
                 <a:ext cx="283091" cy="733791"/>
               </a:xfrm>
               <a:prstGeom prst="rect">
@@ -5044,7 +4881,7 @@
             </p:nvSpPr>
             <p:spPr>
               <a:xfrm>
-                <a:off x="11241157" y="1716643"/>
+                <a:off x="6731083" y="2969706"/>
                 <a:ext cx="283091" cy="733791"/>
               </a:xfrm>
               <a:prstGeom prst="rect">
@@ -5072,6 +4909,252 @@
           </p:sp>
         </mc:Fallback>
       </mc:AlternateContent>
+      <p:cxnSp>
+        <p:nvCxnSpPr>
+          <p:cNvPr id="18" name="Gerade Verbindung mit Pfeil 17">
+            <a:extLst>
+              <a:ext uri="{FF2B5EF4-FFF2-40B4-BE49-F238E27FC236}">
+                <a16:creationId xmlns:a16="http://schemas.microsoft.com/office/drawing/2014/main" id="{0474D31A-B985-4D7B-AA9E-E77C6A920B56}"/>
+              </a:ext>
+            </a:extLst>
+          </p:cNvPr>
+          <p:cNvCxnSpPr>
+            <a:cxnSpLocks/>
+            <a:stCxn id="70" idx="3"/>
+          </p:cNvCxnSpPr>
+          <p:nvPr/>
+        </p:nvCxnSpPr>
+        <p:spPr>
+          <a:xfrm>
+            <a:off x="6078966" y="2114550"/>
+            <a:ext cx="531437" cy="0"/>
+          </a:xfrm>
+          <a:prstGeom prst="straightConnector1">
+            <a:avLst/>
+          </a:prstGeom>
+          <a:ln>
+            <a:tailEnd type="triangle"/>
+          </a:ln>
+        </p:spPr>
+        <p:style>
+          <a:lnRef idx="1">
+            <a:schemeClr val="accent1"/>
+          </a:lnRef>
+          <a:fillRef idx="0">
+            <a:schemeClr val="accent1"/>
+          </a:fillRef>
+          <a:effectRef idx="0">
+            <a:schemeClr val="accent1"/>
+          </a:effectRef>
+          <a:fontRef idx="minor">
+            <a:schemeClr val="tx1"/>
+          </a:fontRef>
+        </p:style>
+      </p:cxnSp>
+      <p:cxnSp>
+        <p:nvCxnSpPr>
+          <p:cNvPr id="25" name="Gerade Verbindung mit Pfeil 24">
+            <a:extLst>
+              <a:ext uri="{FF2B5EF4-FFF2-40B4-BE49-F238E27FC236}">
+                <a16:creationId xmlns:a16="http://schemas.microsoft.com/office/drawing/2014/main" id="{38CEBCF9-7044-4613-A5D0-8721057A255F}"/>
+              </a:ext>
+            </a:extLst>
+          </p:cNvPr>
+          <p:cNvCxnSpPr>
+            <a:cxnSpLocks/>
+            <a:endCxn id="139" idx="1"/>
+          </p:cNvCxnSpPr>
+          <p:nvPr/>
+        </p:nvCxnSpPr>
+        <p:spPr>
+          <a:xfrm>
+            <a:off x="1467738" y="3337064"/>
+            <a:ext cx="774724" cy="0"/>
+          </a:xfrm>
+          <a:prstGeom prst="straightConnector1">
+            <a:avLst/>
+          </a:prstGeom>
+          <a:ln>
+            <a:tailEnd type="triangle"/>
+          </a:ln>
+        </p:spPr>
+        <p:style>
+          <a:lnRef idx="1">
+            <a:schemeClr val="accent1"/>
+          </a:lnRef>
+          <a:fillRef idx="0">
+            <a:schemeClr val="accent1"/>
+          </a:fillRef>
+          <a:effectRef idx="0">
+            <a:schemeClr val="accent1"/>
+          </a:effectRef>
+          <a:fontRef idx="minor">
+            <a:schemeClr val="tx1"/>
+          </a:fontRef>
+        </p:style>
+      </p:cxnSp>
+      <p:cxnSp>
+        <p:nvCxnSpPr>
+          <p:cNvPr id="35" name="Gerade Verbindung mit Pfeil 34">
+            <a:extLst>
+              <a:ext uri="{FF2B5EF4-FFF2-40B4-BE49-F238E27FC236}">
+                <a16:creationId xmlns:a16="http://schemas.microsoft.com/office/drawing/2014/main" id="{6407E443-E7F0-4F8D-A81E-7A492C6DD95D}"/>
+              </a:ext>
+            </a:extLst>
+          </p:cNvPr>
+          <p:cNvCxnSpPr>
+            <a:cxnSpLocks/>
+            <a:stCxn id="21" idx="3"/>
+          </p:cNvCxnSpPr>
+          <p:nvPr/>
+        </p:nvCxnSpPr>
+        <p:spPr>
+          <a:xfrm>
+            <a:off x="6084334" y="988019"/>
+            <a:ext cx="526069" cy="0"/>
+          </a:xfrm>
+          <a:prstGeom prst="straightConnector1">
+            <a:avLst/>
+          </a:prstGeom>
+          <a:ln>
+            <a:tailEnd type="triangle"/>
+          </a:ln>
+        </p:spPr>
+        <p:style>
+          <a:lnRef idx="1">
+            <a:schemeClr val="accent1"/>
+          </a:lnRef>
+          <a:fillRef idx="0">
+            <a:schemeClr val="accent1"/>
+          </a:fillRef>
+          <a:effectRef idx="0">
+            <a:schemeClr val="accent1"/>
+          </a:effectRef>
+          <a:fontRef idx="minor">
+            <a:schemeClr val="tx1"/>
+          </a:fontRef>
+        </p:style>
+      </p:cxnSp>
+      <p:cxnSp>
+        <p:nvCxnSpPr>
+          <p:cNvPr id="38" name="Gerade Verbindung mit Pfeil 37">
+            <a:extLst>
+              <a:ext uri="{FF2B5EF4-FFF2-40B4-BE49-F238E27FC236}">
+                <a16:creationId xmlns:a16="http://schemas.microsoft.com/office/drawing/2014/main" id="{04A10392-46D8-4368-8720-3A575FAD62F1}"/>
+              </a:ext>
+            </a:extLst>
+          </p:cNvPr>
+          <p:cNvCxnSpPr>
+            <a:cxnSpLocks/>
+            <a:endCxn id="30" idx="1"/>
+          </p:cNvCxnSpPr>
+          <p:nvPr/>
+        </p:nvCxnSpPr>
+        <p:spPr>
+          <a:xfrm>
+            <a:off x="1467738" y="2114550"/>
+            <a:ext cx="774726" cy="0"/>
+          </a:xfrm>
+          <a:prstGeom prst="straightConnector1">
+            <a:avLst/>
+          </a:prstGeom>
+          <a:ln>
+            <a:tailEnd type="triangle"/>
+          </a:ln>
+        </p:spPr>
+        <p:style>
+          <a:lnRef idx="1">
+            <a:schemeClr val="accent1"/>
+          </a:lnRef>
+          <a:fillRef idx="0">
+            <a:schemeClr val="accent1"/>
+          </a:fillRef>
+          <a:effectRef idx="0">
+            <a:schemeClr val="accent1"/>
+          </a:effectRef>
+          <a:fontRef idx="minor">
+            <a:schemeClr val="tx1"/>
+          </a:fontRef>
+        </p:style>
+      </p:cxnSp>
+      <p:cxnSp>
+        <p:nvCxnSpPr>
+          <p:cNvPr id="84" name="Verbinder: gekrümmt 83">
+            <a:extLst>
+              <a:ext uri="{FF2B5EF4-FFF2-40B4-BE49-F238E27FC236}">
+                <a16:creationId xmlns:a16="http://schemas.microsoft.com/office/drawing/2014/main" id="{4A16A202-A028-4B45-896C-D3D95531E548}"/>
+              </a:ext>
+            </a:extLst>
+          </p:cNvPr>
+          <p:cNvCxnSpPr>
+            <a:cxnSpLocks/>
+          </p:cNvCxnSpPr>
+          <p:nvPr/>
+        </p:nvCxnSpPr>
+        <p:spPr>
+          <a:xfrm rot="16200000" flipH="1">
+            <a:off x="5720173" y="1588468"/>
+            <a:ext cx="12700" cy="1546910"/>
+          </a:xfrm>
+          <a:prstGeom prst="curvedConnector3">
+            <a:avLst>
+              <a:gd name="adj1" fmla="val 3834787"/>
+            </a:avLst>
+          </a:prstGeom>
+          <a:ln>
+            <a:tailEnd type="triangle"/>
+          </a:ln>
+        </p:spPr>
+        <p:style>
+          <a:lnRef idx="1">
+            <a:schemeClr val="accent1"/>
+          </a:lnRef>
+          <a:fillRef idx="0">
+            <a:schemeClr val="accent1"/>
+          </a:fillRef>
+          <a:effectRef idx="0">
+            <a:schemeClr val="accent1"/>
+          </a:effectRef>
+          <a:fontRef idx="minor">
+            <a:schemeClr val="tx1"/>
+          </a:fontRef>
+        </p:style>
+      </p:cxnSp>
+      <p:sp>
+        <p:nvSpPr>
+          <p:cNvPr id="85" name="Textfeld 84">
+            <a:extLst>
+              <a:ext uri="{FF2B5EF4-FFF2-40B4-BE49-F238E27FC236}">
+                <a16:creationId xmlns:a16="http://schemas.microsoft.com/office/drawing/2014/main" id="{B5A6F75D-FC43-4F2B-BB07-6824ADC82C41}"/>
+              </a:ext>
+            </a:extLst>
+          </p:cNvPr>
+          <p:cNvSpPr txBox="1"/>
+          <p:nvPr/>
+        </p:nvSpPr>
+        <p:spPr>
+          <a:xfrm>
+            <a:off x="5436165" y="2533263"/>
+            <a:ext cx="538930" cy="215444"/>
+          </a:xfrm>
+          <a:prstGeom prst="rect">
+            <a:avLst/>
+          </a:prstGeom>
+          <a:noFill/>
+        </p:spPr>
+        <p:txBody>
+          <a:bodyPr wrap="none" rtlCol="0">
+            <a:spAutoFit/>
+          </a:bodyPr>
+          <a:lstStyle/>
+          <a:p>
+            <a:r>
+              <a:rPr lang="de-DE" sz="800" dirty="0"/>
+              <a:t>Residual</a:t>
+            </a:r>
+          </a:p>
+        </p:txBody>
+      </p:sp>
     </p:spTree>
     <p:extLst>
       <p:ext uri="{BB962C8B-B14F-4D97-AF65-F5344CB8AC3E}">
@@ -5284,6 +5367,9 @@
           <a:prstGeom prst="rect">
             <a:avLst/>
           </a:prstGeom>
+          <a:solidFill>
+            <a:srgbClr val="FF0000"/>
+          </a:solidFill>
         </p:spPr>
         <p:style>
           <a:lnRef idx="2">
@@ -5420,6 +5506,11 @@
           <a:prstGeom prst="rect">
             <a:avLst/>
           </a:prstGeom>
+          <a:solidFill>
+            <a:schemeClr val="accent4">
+              <a:lumMod val="75000"/>
+            </a:schemeClr>
+          </a:solidFill>
         </p:spPr>
         <p:style>
           <a:lnRef idx="2">
@@ -5556,6 +5647,11 @@
           <a:prstGeom prst="rect">
             <a:avLst/>
           </a:prstGeom>
+          <a:solidFill>
+            <a:schemeClr val="accent4">
+              <a:lumMod val="75000"/>
+            </a:schemeClr>
+          </a:solidFill>
         </p:spPr>
         <p:style>
           <a:lnRef idx="2">
@@ -5649,6 +5745,11 @@
           <a:prstGeom prst="rect">
             <a:avLst/>
           </a:prstGeom>
+          <a:solidFill>
+            <a:schemeClr val="accent4">
+              <a:lumMod val="75000"/>
+            </a:schemeClr>
+          </a:solidFill>
         </p:spPr>
         <p:style>
           <a:lnRef idx="2">
@@ -5785,6 +5886,11 @@
           <a:prstGeom prst="rect">
             <a:avLst/>
           </a:prstGeom>
+          <a:solidFill>
+            <a:schemeClr val="accent4">
+              <a:lumMod val="75000"/>
+            </a:schemeClr>
+          </a:solidFill>
         </p:spPr>
         <p:style>
           <a:lnRef idx="2">
@@ -5947,49 +6053,6 @@
           </a:fontRef>
         </p:style>
       </p:cxnSp>
-      <p:cxnSp>
-        <p:nvCxnSpPr>
-          <p:cNvPr id="34" name="Verbinder: gewinkelt 33">
-            <a:extLst>
-              <a:ext uri="{FF2B5EF4-FFF2-40B4-BE49-F238E27FC236}">
-                <a16:creationId xmlns:a16="http://schemas.microsoft.com/office/drawing/2014/main" id="{C0D6273B-63DE-4B26-9E74-33F6D5279FE8}"/>
-              </a:ext>
-            </a:extLst>
-          </p:cNvPr>
-          <p:cNvCxnSpPr>
-            <a:cxnSpLocks/>
-            <a:stCxn id="15" idx="2"/>
-            <a:endCxn id="39" idx="1"/>
-          </p:cNvCxnSpPr>
-          <p:nvPr/>
-        </p:nvCxnSpPr>
-        <p:spPr>
-          <a:xfrm rot="16200000" flipH="1">
-            <a:off x="2895873" y="1770022"/>
-            <a:ext cx="578222" cy="1179098"/>
-          </a:xfrm>
-          <a:prstGeom prst="bentConnector2">
-            <a:avLst/>
-          </a:prstGeom>
-          <a:ln>
-            <a:tailEnd type="triangle"/>
-          </a:ln>
-        </p:spPr>
-        <p:style>
-          <a:lnRef idx="1">
-            <a:schemeClr val="accent1"/>
-          </a:lnRef>
-          <a:fillRef idx="0">
-            <a:schemeClr val="accent1"/>
-          </a:fillRef>
-          <a:effectRef idx="0">
-            <a:schemeClr val="accent1"/>
-          </a:effectRef>
-          <a:fontRef idx="minor">
-            <a:schemeClr val="tx1"/>
-          </a:fontRef>
-        </p:style>
-      </p:cxnSp>
       <p:sp>
         <p:nvSpPr>
           <p:cNvPr id="39" name="Rechteck 38">
@@ -6004,12 +6067,17 @@
         </p:nvSpPr>
         <p:spPr>
           <a:xfrm>
-            <a:off x="3774533" y="2407658"/>
+            <a:off x="2222100" y="2433237"/>
             <a:ext cx="746670" cy="482048"/>
           </a:xfrm>
           <a:prstGeom prst="rect">
             <a:avLst/>
           </a:prstGeom>
+          <a:solidFill>
+            <a:schemeClr val="accent4">
+              <a:lumMod val="75000"/>
+            </a:schemeClr>
+          </a:solidFill>
         </p:spPr>
         <p:style>
           <a:lnRef idx="2">
@@ -6066,8 +6134,8 @@
         </p:nvCxnSpPr>
         <p:spPr>
           <a:xfrm>
-            <a:off x="4521203" y="2648682"/>
-            <a:ext cx="784664" cy="0"/>
+            <a:off x="2968770" y="2674261"/>
+            <a:ext cx="805763" cy="0"/>
           </a:xfrm>
           <a:prstGeom prst="straightConnector1">
             <a:avLst/>
@@ -6105,7 +6173,7 @@
         </p:nvSpPr>
         <p:spPr>
           <a:xfrm>
-            <a:off x="4521203" y="2648682"/>
+            <a:off x="2982589" y="2687051"/>
             <a:ext cx="813043" cy="215444"/>
           </a:xfrm>
           <a:prstGeom prst="rect">
@@ -6140,12 +6208,17 @@
         </p:nvSpPr>
         <p:spPr>
           <a:xfrm>
-            <a:off x="5305867" y="2407658"/>
+            <a:off x="3774533" y="2433237"/>
             <a:ext cx="746670" cy="482048"/>
           </a:xfrm>
           <a:prstGeom prst="rect">
             <a:avLst/>
           </a:prstGeom>
+          <a:solidFill>
+            <a:schemeClr val="accent4">
+              <a:lumMod val="75000"/>
+            </a:schemeClr>
+          </a:solidFill>
         </p:spPr>
         <p:style>
           <a:lnRef idx="2">
@@ -6202,8 +6275,8 @@
         </p:nvCxnSpPr>
         <p:spPr>
           <a:xfrm>
-            <a:off x="6052537" y="2648682"/>
-            <a:ext cx="784664" cy="0"/>
+            <a:off x="4521203" y="2674261"/>
+            <a:ext cx="805763" cy="0"/>
           </a:xfrm>
           <a:prstGeom prst="straightConnector1">
             <a:avLst/>
@@ -6241,7 +6314,7 @@
         </p:nvSpPr>
         <p:spPr>
           <a:xfrm>
-            <a:off x="6052537" y="2648682"/>
+            <a:off x="4535053" y="2698841"/>
             <a:ext cx="813043" cy="215444"/>
           </a:xfrm>
           <a:prstGeom prst="rect">
@@ -6276,12 +6349,17 @@
         </p:nvSpPr>
         <p:spPr>
           <a:xfrm>
-            <a:off x="6837201" y="2407658"/>
+            <a:off x="5326966" y="2433237"/>
             <a:ext cx="746670" cy="482048"/>
           </a:xfrm>
           <a:prstGeom prst="rect">
             <a:avLst/>
           </a:prstGeom>
+          <a:solidFill>
+            <a:schemeClr val="accent4">
+              <a:lumMod val="75000"/>
+            </a:schemeClr>
+          </a:solidFill>
         </p:spPr>
         <p:style>
           <a:lnRef idx="2">
@@ -6334,12 +6412,17 @@
         </p:nvSpPr>
         <p:spPr>
           <a:xfrm>
-            <a:off x="5326966" y="1588412"/>
+            <a:off x="5326966" y="1588411"/>
             <a:ext cx="746670" cy="482048"/>
           </a:xfrm>
           <a:prstGeom prst="rect">
             <a:avLst/>
           </a:prstGeom>
+          <a:solidFill>
+            <a:schemeClr val="accent4">
+              <a:lumMod val="75000"/>
+            </a:schemeClr>
+          </a:solidFill>
         </p:spPr>
         <p:style>
           <a:lnRef idx="2">
@@ -6392,7 +6475,7 @@
         </p:nvSpPr>
         <p:spPr>
           <a:xfrm>
-            <a:off x="9101015" y="1855651"/>
+            <a:off x="6132729" y="1843467"/>
             <a:ext cx="813043" cy="215444"/>
           </a:xfrm>
           <a:prstGeom prst="rect">
@@ -6431,8 +6514,8 @@
         </p:nvCxnSpPr>
         <p:spPr>
           <a:xfrm>
-            <a:off x="7583871" y="2648682"/>
-            <a:ext cx="784664" cy="0"/>
+            <a:off x="6073636" y="2674261"/>
+            <a:ext cx="810941" cy="0"/>
           </a:xfrm>
           <a:prstGeom prst="straightConnector1">
             <a:avLst/>
@@ -6470,7 +6553,7 @@
         </p:nvSpPr>
         <p:spPr>
           <a:xfrm>
-            <a:off x="7583871" y="2648682"/>
+            <a:off x="6072584" y="2698841"/>
             <a:ext cx="813043" cy="215444"/>
           </a:xfrm>
           <a:prstGeom prst="rect">
@@ -6505,12 +6588,17 @@
         </p:nvSpPr>
         <p:spPr>
           <a:xfrm>
-            <a:off x="8368535" y="2407658"/>
+            <a:off x="6884577" y="2433237"/>
             <a:ext cx="746670" cy="482048"/>
           </a:xfrm>
           <a:prstGeom prst="rect">
             <a:avLst/>
           </a:prstGeom>
+          <a:solidFill>
+            <a:schemeClr val="accent4">
+              <a:lumMod val="75000"/>
+            </a:schemeClr>
+          </a:solidFill>
         </p:spPr>
         <p:style>
           <a:lnRef idx="2">
@@ -6567,8 +6655,8 @@
         </p:nvCxnSpPr>
         <p:spPr>
           <a:xfrm>
-            <a:off x="9115205" y="2648682"/>
-            <a:ext cx="784664" cy="0"/>
+            <a:off x="7631247" y="2674261"/>
+            <a:ext cx="745335" cy="0"/>
           </a:xfrm>
           <a:prstGeom prst="straightConnector1">
             <a:avLst/>
@@ -6606,7 +6694,7 @@
         </p:nvSpPr>
         <p:spPr>
           <a:xfrm>
-            <a:off x="9115205" y="2648682"/>
+            <a:off x="7600862" y="2698841"/>
             <a:ext cx="813043" cy="215444"/>
           </a:xfrm>
           <a:prstGeom prst="rect">
@@ -6641,12 +6729,18 @@
         </p:nvSpPr>
         <p:spPr>
           <a:xfrm>
-            <a:off x="9899869" y="2407658"/>
+            <a:off x="8376582" y="2433237"/>
             <a:ext cx="746670" cy="482048"/>
           </a:xfrm>
           <a:prstGeom prst="rect">
             <a:avLst/>
           </a:prstGeom>
+          <a:solidFill>
+            <a:schemeClr val="tx1">
+              <a:lumMod val="95000"/>
+              <a:lumOff val="5000"/>
+            </a:schemeClr>
+          </a:solidFill>
         </p:spPr>
         <p:style>
           <a:lnRef idx="2">
@@ -6707,8 +6801,8 @@
         </p:nvCxnSpPr>
         <p:spPr>
           <a:xfrm>
-            <a:off x="6073636" y="1829436"/>
-            <a:ext cx="4199568" cy="578222"/>
+            <a:off x="6073636" y="1829435"/>
+            <a:ext cx="2676281" cy="603802"/>
           </a:xfrm>
           <a:prstGeom prst="bentConnector2">
             <a:avLst/>
@@ -6743,13 +6837,14 @@
           </p:cNvPr>
           <p:cNvCxnSpPr>
             <a:cxnSpLocks/>
+            <a:stCxn id="64" idx="3"/>
           </p:cNvCxnSpPr>
           <p:nvPr/>
         </p:nvCxnSpPr>
         <p:spPr>
           <a:xfrm>
-            <a:off x="10646539" y="2648682"/>
-            <a:ext cx="784664" cy="0"/>
+            <a:off x="9123252" y="2674261"/>
+            <a:ext cx="846648" cy="0"/>
           </a:xfrm>
           <a:prstGeom prst="straightConnector1">
             <a:avLst/>
@@ -6787,7 +6882,7 @@
         </p:nvSpPr>
         <p:spPr>
           <a:xfrm>
-            <a:off x="10632349" y="2645660"/>
+            <a:off x="9140054" y="2687051"/>
             <a:ext cx="813043" cy="215444"/>
           </a:xfrm>
           <a:prstGeom prst="rect">
@@ -6808,6 +6903,49 @@
           </a:p>
         </p:txBody>
       </p:sp>
+      <p:cxnSp>
+        <p:nvCxnSpPr>
+          <p:cNvPr id="25" name="Gerade Verbindung mit Pfeil 24">
+            <a:extLst>
+              <a:ext uri="{FF2B5EF4-FFF2-40B4-BE49-F238E27FC236}">
+                <a16:creationId xmlns:a16="http://schemas.microsoft.com/office/drawing/2014/main" id="{CC22A711-7633-4BFD-B506-50EE06902FBF}"/>
+              </a:ext>
+            </a:extLst>
+          </p:cNvPr>
+          <p:cNvCxnSpPr>
+            <a:cxnSpLocks/>
+            <a:stCxn id="15" idx="2"/>
+            <a:endCxn id="39" idx="0"/>
+          </p:cNvCxnSpPr>
+          <p:nvPr/>
+        </p:nvCxnSpPr>
+        <p:spPr>
+          <a:xfrm>
+            <a:off x="2595435" y="2070460"/>
+            <a:ext cx="0" cy="362777"/>
+          </a:xfrm>
+          <a:prstGeom prst="straightConnector1">
+            <a:avLst/>
+          </a:prstGeom>
+          <a:ln>
+            <a:tailEnd type="triangle"/>
+          </a:ln>
+        </p:spPr>
+        <p:style>
+          <a:lnRef idx="1">
+            <a:schemeClr val="accent1"/>
+          </a:lnRef>
+          <a:fillRef idx="0">
+            <a:schemeClr val="accent1"/>
+          </a:fillRef>
+          <a:effectRef idx="0">
+            <a:schemeClr val="accent1"/>
+          </a:effectRef>
+          <a:fontRef idx="minor">
+            <a:schemeClr val="tx1"/>
+          </a:fontRef>
+        </p:style>
+      </p:cxnSp>
     </p:spTree>
     <p:extLst>
       <p:ext uri="{BB962C8B-B14F-4D97-AF65-F5344CB8AC3E}">
@@ -7150,6 +7288,9 @@
           <a:prstGeom prst="rect">
             <a:avLst/>
           </a:prstGeom>
+          <a:solidFill>
+            <a:srgbClr val="00B050"/>
+          </a:solidFill>
         </p:spPr>
         <p:style>
           <a:lnRef idx="2">
@@ -7207,6 +7348,11 @@
           <a:prstGeom prst="rect">
             <a:avLst/>
           </a:prstGeom>
+          <a:solidFill>
+            <a:schemeClr val="accent4">
+              <a:lumMod val="75000"/>
+            </a:schemeClr>
+          </a:solidFill>
         </p:spPr>
         <p:style>
           <a:lnRef idx="2">
@@ -7265,6 +7411,11 @@
           <a:prstGeom prst="rect">
             <a:avLst/>
           </a:prstGeom>
+          <a:solidFill>
+            <a:schemeClr val="accent4">
+              <a:lumMod val="75000"/>
+            </a:schemeClr>
+          </a:solidFill>
         </p:spPr>
         <p:style>
           <a:lnRef idx="2">
@@ -7323,6 +7474,11 @@
           <a:prstGeom prst="rect">
             <a:avLst/>
           </a:prstGeom>
+          <a:solidFill>
+            <a:schemeClr val="accent4">
+              <a:lumMod val="75000"/>
+            </a:schemeClr>
+          </a:solidFill>
         </p:spPr>
         <p:style>
           <a:lnRef idx="2">
@@ -7427,6 +7583,11 @@
           <a:prstGeom prst="rect">
             <a:avLst/>
           </a:prstGeom>
+          <a:solidFill>
+            <a:schemeClr val="accent4">
+              <a:lumMod val="75000"/>
+            </a:schemeClr>
+          </a:solidFill>
         </p:spPr>
         <p:style>
           <a:lnRef idx="2">
@@ -7485,6 +7646,11 @@
           <a:prstGeom prst="rect">
             <a:avLst/>
           </a:prstGeom>
+          <a:solidFill>
+            <a:schemeClr val="accent4">
+              <a:lumMod val="75000"/>
+            </a:schemeClr>
+          </a:solidFill>
         </p:spPr>
         <p:style>
           <a:lnRef idx="2">
@@ -7543,6 +7709,11 @@
           <a:prstGeom prst="rect">
             <a:avLst/>
           </a:prstGeom>
+          <a:solidFill>
+            <a:schemeClr val="accent4">
+              <a:lumMod val="75000"/>
+            </a:schemeClr>
+          </a:solidFill>
         </p:spPr>
         <p:style>
           <a:lnRef idx="2">
@@ -7601,6 +7772,11 @@
           <a:prstGeom prst="rect">
             <a:avLst/>
           </a:prstGeom>
+          <a:solidFill>
+            <a:schemeClr val="accent4">
+              <a:lumMod val="75000"/>
+            </a:schemeClr>
+          </a:solidFill>
         </p:spPr>
         <p:style>
           <a:lnRef idx="2">
@@ -7659,6 +7835,9 @@
           <a:prstGeom prst="rect">
             <a:avLst/>
           </a:prstGeom>
+          <a:solidFill>
+            <a:schemeClr val="tx1"/>
+          </a:solidFill>
         </p:spPr>
         <p:style>
           <a:lnRef idx="2">
@@ -8252,6 +8431,9 @@
           <a:prstGeom prst="rect">
             <a:avLst/>
           </a:prstGeom>
+          <a:solidFill>
+            <a:srgbClr val="00B050"/>
+          </a:solidFill>
         </p:spPr>
         <p:style>
           <a:lnRef idx="2">
@@ -8309,6 +8491,11 @@
           <a:prstGeom prst="rect">
             <a:avLst/>
           </a:prstGeom>
+          <a:solidFill>
+            <a:schemeClr val="accent4">
+              <a:lumMod val="75000"/>
+            </a:schemeClr>
+          </a:solidFill>
         </p:spPr>
         <p:style>
           <a:lnRef idx="2">
@@ -8367,6 +8554,11 @@
           <a:prstGeom prst="rect">
             <a:avLst/>
           </a:prstGeom>
+          <a:solidFill>
+            <a:schemeClr val="accent4">
+              <a:lumMod val="75000"/>
+            </a:schemeClr>
+          </a:solidFill>
         </p:spPr>
         <p:style>
           <a:lnRef idx="2">
@@ -8425,6 +8617,11 @@
           <a:prstGeom prst="rect">
             <a:avLst/>
           </a:prstGeom>
+          <a:solidFill>
+            <a:schemeClr val="accent4">
+              <a:lumMod val="75000"/>
+            </a:schemeClr>
+          </a:solidFill>
         </p:spPr>
         <p:style>
           <a:lnRef idx="2">
@@ -8529,6 +8726,11 @@
           <a:prstGeom prst="rect">
             <a:avLst/>
           </a:prstGeom>
+          <a:solidFill>
+            <a:schemeClr val="accent4">
+              <a:lumMod val="75000"/>
+            </a:schemeClr>
+          </a:solidFill>
         </p:spPr>
         <p:style>
           <a:lnRef idx="2">
@@ -8587,6 +8789,11 @@
           <a:prstGeom prst="rect">
             <a:avLst/>
           </a:prstGeom>
+          <a:solidFill>
+            <a:schemeClr val="accent4">
+              <a:lumMod val="75000"/>
+            </a:schemeClr>
+          </a:solidFill>
         </p:spPr>
         <p:style>
           <a:lnRef idx="2">
@@ -8645,6 +8852,11 @@
           <a:prstGeom prst="rect">
             <a:avLst/>
           </a:prstGeom>
+          <a:solidFill>
+            <a:schemeClr val="accent4">
+              <a:lumMod val="75000"/>
+            </a:schemeClr>
+          </a:solidFill>
         </p:spPr>
         <p:style>
           <a:lnRef idx="2">
@@ -8703,6 +8915,11 @@
           <a:prstGeom prst="rect">
             <a:avLst/>
           </a:prstGeom>
+          <a:solidFill>
+            <a:schemeClr val="accent4">
+              <a:lumMod val="75000"/>
+            </a:schemeClr>
+          </a:solidFill>
         </p:spPr>
         <p:style>
           <a:lnRef idx="2">
@@ -8761,6 +8978,9 @@
           <a:prstGeom prst="rect">
             <a:avLst/>
           </a:prstGeom>
+          <a:solidFill>
+            <a:schemeClr val="tx1"/>
+          </a:solidFill>
         </p:spPr>
         <p:style>
           <a:lnRef idx="2">
@@ -9146,6 +9366,11 @@
           <a:prstGeom prst="rect">
             <a:avLst/>
           </a:prstGeom>
+          <a:solidFill>
+            <a:schemeClr val="accent4">
+              <a:lumMod val="75000"/>
+            </a:schemeClr>
+          </a:solidFill>
         </p:spPr>
         <p:style>
           <a:lnRef idx="2">
@@ -9247,6 +9472,11 @@
           <a:prstGeom prst="rect">
             <a:avLst/>
           </a:prstGeom>
+          <a:solidFill>
+            <a:schemeClr val="accent4">
+              <a:lumMod val="75000"/>
+            </a:schemeClr>
+          </a:solidFill>
         </p:spPr>
         <p:style>
           <a:lnRef idx="2">
@@ -9305,6 +9535,11 @@
           <a:prstGeom prst="rect">
             <a:avLst/>
           </a:prstGeom>
+          <a:solidFill>
+            <a:schemeClr val="accent4">
+              <a:lumMod val="75000"/>
+            </a:schemeClr>
+          </a:solidFill>
         </p:spPr>
         <p:style>
           <a:lnRef idx="2">
@@ -9656,6 +9891,9 @@
           <a:prstGeom prst="rect">
             <a:avLst/>
           </a:prstGeom>
+          <a:solidFill>
+            <a:srgbClr val="00B050"/>
+          </a:solidFill>
         </p:spPr>
         <p:style>
           <a:lnRef idx="2">
@@ -9713,6 +9951,11 @@
           <a:prstGeom prst="rect">
             <a:avLst/>
           </a:prstGeom>
+          <a:solidFill>
+            <a:schemeClr val="accent4">
+              <a:lumMod val="75000"/>
+            </a:schemeClr>
+          </a:solidFill>
         </p:spPr>
         <p:style>
           <a:lnRef idx="2">
@@ -9771,6 +10014,11 @@
           <a:prstGeom prst="rect">
             <a:avLst/>
           </a:prstGeom>
+          <a:solidFill>
+            <a:schemeClr val="accent4">
+              <a:lumMod val="75000"/>
+            </a:schemeClr>
+          </a:solidFill>
         </p:spPr>
         <p:style>
           <a:lnRef idx="2">
@@ -9829,6 +10077,11 @@
           <a:prstGeom prst="rect">
             <a:avLst/>
           </a:prstGeom>
+          <a:solidFill>
+            <a:schemeClr val="accent4">
+              <a:lumMod val="75000"/>
+            </a:schemeClr>
+          </a:solidFill>
         </p:spPr>
         <p:style>
           <a:lnRef idx="2">
@@ -9933,6 +10186,11 @@
           <a:prstGeom prst="rect">
             <a:avLst/>
           </a:prstGeom>
+          <a:solidFill>
+            <a:schemeClr val="accent4">
+              <a:lumMod val="75000"/>
+            </a:schemeClr>
+          </a:solidFill>
         </p:spPr>
         <p:style>
           <a:lnRef idx="2">
@@ -9991,6 +10249,11 @@
           <a:prstGeom prst="rect">
             <a:avLst/>
           </a:prstGeom>
+          <a:solidFill>
+            <a:schemeClr val="accent4">
+              <a:lumMod val="75000"/>
+            </a:schemeClr>
+          </a:solidFill>
         </p:spPr>
         <p:style>
           <a:lnRef idx="2">
@@ -10049,6 +10312,11 @@
           <a:prstGeom prst="rect">
             <a:avLst/>
           </a:prstGeom>
+          <a:solidFill>
+            <a:schemeClr val="accent4">
+              <a:lumMod val="75000"/>
+            </a:schemeClr>
+          </a:solidFill>
         </p:spPr>
         <p:style>
           <a:lnRef idx="2">
@@ -10107,6 +10375,11 @@
           <a:prstGeom prst="rect">
             <a:avLst/>
           </a:prstGeom>
+          <a:solidFill>
+            <a:schemeClr val="accent4">
+              <a:lumMod val="75000"/>
+            </a:schemeClr>
+          </a:solidFill>
         </p:spPr>
         <p:style>
           <a:lnRef idx="2">
@@ -10165,6 +10438,9 @@
           <a:prstGeom prst="rect">
             <a:avLst/>
           </a:prstGeom>
+          <a:solidFill>
+            <a:schemeClr val="tx1"/>
+          </a:solidFill>
         </p:spPr>
         <p:style>
           <a:lnRef idx="2">
@@ -10550,6 +10826,11 @@
           <a:prstGeom prst="rect">
             <a:avLst/>
           </a:prstGeom>
+          <a:solidFill>
+            <a:schemeClr val="accent4">
+              <a:lumMod val="75000"/>
+            </a:schemeClr>
+          </a:solidFill>
         </p:spPr>
         <p:style>
           <a:lnRef idx="2">
@@ -10608,6 +10889,11 @@
           <a:prstGeom prst="rect">
             <a:avLst/>
           </a:prstGeom>
+          <a:solidFill>
+            <a:schemeClr val="accent4">
+              <a:lumMod val="75000"/>
+            </a:schemeClr>
+          </a:solidFill>
         </p:spPr>
         <p:style>
           <a:lnRef idx="2">
@@ -10666,6 +10952,11 @@
           <a:prstGeom prst="rect">
             <a:avLst/>
           </a:prstGeom>
+          <a:solidFill>
+            <a:schemeClr val="accent4">
+              <a:lumMod val="75000"/>
+            </a:schemeClr>
+          </a:solidFill>
         </p:spPr>
         <p:style>
           <a:lnRef idx="2">
@@ -11394,6 +11685,9 @@
           <a:prstGeom prst="rect">
             <a:avLst/>
           </a:prstGeom>
+          <a:solidFill>
+            <a:srgbClr val="FF0000"/>
+          </a:solidFill>
         </p:spPr>
         <p:style>
           <a:lnRef idx="2">
@@ -11451,6 +11745,11 @@
           <a:prstGeom prst="rect">
             <a:avLst/>
           </a:prstGeom>
+          <a:solidFill>
+            <a:schemeClr val="accent4">
+              <a:lumMod val="75000"/>
+            </a:schemeClr>
+          </a:solidFill>
         </p:spPr>
         <p:style>
           <a:lnRef idx="2">
@@ -11509,6 +11808,11 @@
           <a:prstGeom prst="rect">
             <a:avLst/>
           </a:prstGeom>
+          <a:solidFill>
+            <a:schemeClr val="accent4">
+              <a:lumMod val="75000"/>
+            </a:schemeClr>
+          </a:solidFill>
         </p:spPr>
         <p:style>
           <a:lnRef idx="2">
@@ -11567,6 +11871,11 @@
           <a:prstGeom prst="rect">
             <a:avLst/>
           </a:prstGeom>
+          <a:solidFill>
+            <a:schemeClr val="accent4">
+              <a:lumMod val="75000"/>
+            </a:schemeClr>
+          </a:solidFill>
         </p:spPr>
         <p:style>
           <a:lnRef idx="2">
@@ -11660,6 +11969,11 @@
           <a:prstGeom prst="rect">
             <a:avLst/>
           </a:prstGeom>
+          <a:solidFill>
+            <a:schemeClr val="accent4">
+              <a:lumMod val="75000"/>
+            </a:schemeClr>
+          </a:solidFill>
         </p:spPr>
         <p:style>
           <a:lnRef idx="2">
@@ -11725,6 +12039,9 @@
           <a:prstGeom prst="rect">
             <a:avLst/>
           </a:prstGeom>
+          <a:solidFill>
+            <a:schemeClr val="tx1"/>
+          </a:solidFill>
         </p:spPr>
         <p:style>
           <a:lnRef idx="2">
@@ -12212,6 +12529,9 @@
           <a:prstGeom prst="rect">
             <a:avLst/>
           </a:prstGeom>
+          <a:solidFill>
+            <a:srgbClr val="FF0000"/>
+          </a:solidFill>
         </p:spPr>
         <p:style>
           <a:lnRef idx="2">
@@ -12269,6 +12589,11 @@
           <a:prstGeom prst="rect">
             <a:avLst/>
           </a:prstGeom>
+          <a:solidFill>
+            <a:schemeClr val="accent4">
+              <a:lumMod val="75000"/>
+            </a:schemeClr>
+          </a:solidFill>
         </p:spPr>
         <p:style>
           <a:lnRef idx="2">
@@ -12327,6 +12652,11 @@
           <a:prstGeom prst="rect">
             <a:avLst/>
           </a:prstGeom>
+          <a:solidFill>
+            <a:schemeClr val="accent4">
+              <a:lumMod val="75000"/>
+            </a:schemeClr>
+          </a:solidFill>
         </p:spPr>
         <p:style>
           <a:lnRef idx="2">
@@ -12385,6 +12715,11 @@
           <a:prstGeom prst="rect">
             <a:avLst/>
           </a:prstGeom>
+          <a:solidFill>
+            <a:schemeClr val="accent4">
+              <a:lumMod val="75000"/>
+            </a:schemeClr>
+          </a:solidFill>
         </p:spPr>
         <p:style>
           <a:lnRef idx="2">
@@ -12489,6 +12824,11 @@
           <a:prstGeom prst="rect">
             <a:avLst/>
           </a:prstGeom>
+          <a:solidFill>
+            <a:schemeClr val="accent4">
+              <a:lumMod val="75000"/>
+            </a:schemeClr>
+          </a:solidFill>
         </p:spPr>
         <p:style>
           <a:lnRef idx="2">
@@ -12547,6 +12887,11 @@
           <a:prstGeom prst="rect">
             <a:avLst/>
           </a:prstGeom>
+          <a:solidFill>
+            <a:schemeClr val="accent4">
+              <a:lumMod val="75000"/>
+            </a:schemeClr>
+          </a:solidFill>
         </p:spPr>
         <p:style>
           <a:lnRef idx="2">
@@ -12605,6 +12950,11 @@
           <a:prstGeom prst="rect">
             <a:avLst/>
           </a:prstGeom>
+          <a:solidFill>
+            <a:schemeClr val="accent4">
+              <a:lumMod val="75000"/>
+            </a:schemeClr>
+          </a:solidFill>
         </p:spPr>
         <p:style>
           <a:lnRef idx="2">
@@ -12663,6 +13013,9 @@
           <a:prstGeom prst="rect">
             <a:avLst/>
           </a:prstGeom>
+          <a:solidFill>
+            <a:schemeClr val="tx1"/>
+          </a:solidFill>
         </p:spPr>
         <p:style>
           <a:lnRef idx="2">
@@ -13037,6 +13390,11 @@
           <a:prstGeom prst="rect">
             <a:avLst/>
           </a:prstGeom>
+          <a:solidFill>
+            <a:schemeClr val="accent4">
+              <a:lumMod val="75000"/>
+            </a:schemeClr>
+          </a:solidFill>
         </p:spPr>
         <p:style>
           <a:lnRef idx="2">
@@ -13252,8 +13610,8 @@
         </p:nvCxnSpPr>
         <p:spPr>
           <a:xfrm flipV="1">
-            <a:off x="1912821" y="5219469"/>
-            <a:ext cx="1437203" cy="430403"/>
+            <a:off x="1912821" y="5021089"/>
+            <a:ext cx="1437203" cy="628783"/>
           </a:xfrm>
           <a:prstGeom prst="straightConnector1">
             <a:avLst/>
@@ -13291,12 +13649,15 @@
         </p:nvSpPr>
         <p:spPr>
           <a:xfrm>
-            <a:off x="2699474" y="4737421"/>
+            <a:off x="2699474" y="4539041"/>
             <a:ext cx="1301100" cy="482048"/>
           </a:xfrm>
           <a:prstGeom prst="rect">
             <a:avLst/>
           </a:prstGeom>
+          <a:solidFill>
+            <a:srgbClr val="92D050"/>
+          </a:solidFill>
         </p:spPr>
         <p:style>
           <a:lnRef idx="2">
@@ -13341,12 +13702,15 @@
         </p:nvSpPr>
         <p:spPr>
           <a:xfrm>
-            <a:off x="2699474" y="3824970"/>
+            <a:off x="2699474" y="3368744"/>
             <a:ext cx="1301100" cy="482048"/>
           </a:xfrm>
           <a:prstGeom prst="rect">
             <a:avLst/>
           </a:prstGeom>
+          <a:solidFill>
+            <a:srgbClr val="00B0F0"/>
+          </a:solidFill>
         </p:spPr>
         <p:style>
           <a:lnRef idx="2">
@@ -13386,62 +13750,20 @@
             <a:pPr algn="ctr"/>
             <a:r>
               <a:rPr lang="de-DE" sz="800" dirty="0"/>
-              <a:t>Units=AD/RR</a:t>
-            </a:r>
-            <a:endParaRPr lang="de-DE" sz="1000" dirty="0"/>
-          </a:p>
-        </p:txBody>
-      </p:sp>
-      <p:sp>
-        <p:nvSpPr>
-          <p:cNvPr id="13" name="Rechteck 12">
-            <a:extLst>
-              <a:ext uri="{FF2B5EF4-FFF2-40B4-BE49-F238E27FC236}">
-                <a16:creationId xmlns:a16="http://schemas.microsoft.com/office/drawing/2014/main" id="{1CA4447D-7F04-4E86-905F-6CE91AA5824C}"/>
-              </a:ext>
-            </a:extLst>
-          </p:cNvPr>
-          <p:cNvSpPr/>
-          <p:nvPr/>
-        </p:nvSpPr>
-        <p:spPr>
-          <a:xfrm>
-            <a:off x="2699474" y="2912519"/>
-            <a:ext cx="1301100" cy="482048"/>
-          </a:xfrm>
-          <a:prstGeom prst="rect">
-            <a:avLst/>
-          </a:prstGeom>
-        </p:spPr>
-        <p:style>
-          <a:lnRef idx="2">
-            <a:schemeClr val="accent1">
-              <a:shade val="50000"/>
-            </a:schemeClr>
-          </a:lnRef>
-          <a:fillRef idx="1">
-            <a:schemeClr val="accent1"/>
-          </a:fillRef>
-          <a:effectRef idx="0">
-            <a:schemeClr val="accent1"/>
-          </a:effectRef>
-          <a:fontRef idx="minor">
-            <a:schemeClr val="lt1"/>
-          </a:fontRef>
-        </p:style>
-        <p:txBody>
-          <a:bodyPr rtlCol="0" anchor="ctr"/>
-          <a:lstStyle/>
-          <a:p>
-            <a:pPr algn="ctr"/>
+              <a:t>Units=AD/RR,</a:t>
+            </a:r>
+          </a:p>
+          <a:p>
+            <a:pPr algn="ctr"/>
+            <a:r>
+              <a:rPr lang="de-DE" sz="800" dirty="0"/>
+              <a:t>Aktivierung=</a:t>
+            </a:r>
             <a:r>
               <a:rPr lang="de-DE" sz="800" dirty="0" err="1"/>
               <a:t>ReLU</a:t>
             </a:r>
-            <a:r>
-              <a:rPr lang="de-DE" sz="800" dirty="0"/>
-              <a:t>-Aktivierung</a:t>
-            </a:r>
+            <a:endParaRPr lang="de-DE" sz="1000" dirty="0"/>
           </a:p>
         </p:txBody>
       </p:sp>
@@ -13465,6 +13787,9 @@
           <a:prstGeom prst="rect">
             <a:avLst/>
           </a:prstGeom>
+          <a:solidFill>
+            <a:schemeClr val="accent2"/>
+          </a:solidFill>
         </p:spPr>
         <p:style>
           <a:lnRef idx="2">
@@ -13513,8 +13838,8 @@
         </p:nvCxnSpPr>
         <p:spPr>
           <a:xfrm flipV="1">
-            <a:off x="3350024" y="4307018"/>
-            <a:ext cx="0" cy="430403"/>
+            <a:off x="3350024" y="3850792"/>
+            <a:ext cx="0" cy="688249"/>
           </a:xfrm>
           <a:prstGeom prst="straightConnector1">
             <a:avLst/>
@@ -13550,14 +13875,14 @@
           <p:cNvCxnSpPr>
             <a:cxnSpLocks/>
             <a:stCxn id="11" idx="0"/>
-            <a:endCxn id="13" idx="2"/>
+            <a:endCxn id="37" idx="2"/>
           </p:cNvCxnSpPr>
           <p:nvPr/>
         </p:nvCxnSpPr>
         <p:spPr>
           <a:xfrm flipV="1">
-            <a:off x="3350024" y="3394567"/>
-            <a:ext cx="0" cy="430403"/>
+            <a:off x="3350024" y="2680495"/>
+            <a:ext cx="0" cy="688249"/>
           </a:xfrm>
           <a:prstGeom prst="straightConnector1">
             <a:avLst/>
@@ -13638,12 +13963,15 @@
         </p:nvSpPr>
         <p:spPr>
           <a:xfrm>
-            <a:off x="2699474" y="2000068"/>
+            <a:off x="2699474" y="2198447"/>
             <a:ext cx="1301100" cy="482048"/>
           </a:xfrm>
           <a:prstGeom prst="rect">
             <a:avLst/>
           </a:prstGeom>
+          <a:solidFill>
+            <a:srgbClr val="00B0F0"/>
+          </a:solidFill>
         </p:spPr>
         <p:style>
           <a:lnRef idx="2">
@@ -13683,7 +14011,7 @@
             <a:pPr algn="ctr"/>
             <a:r>
               <a:rPr lang="de-DE" sz="800" dirty="0"/>
-              <a:t>Units=AD., Aktivierung=Sigmoid</a:t>
+              <a:t>Units=AD, Aktivierung=Sigmoid</a:t>
             </a:r>
           </a:p>
         </p:txBody>
@@ -13738,49 +14066,6 @@
           </a:p>
         </p:txBody>
       </p:sp>
-      <p:cxnSp>
-        <p:nvCxnSpPr>
-          <p:cNvPr id="49" name="Gerade Verbindung mit Pfeil 48">
-            <a:extLst>
-              <a:ext uri="{FF2B5EF4-FFF2-40B4-BE49-F238E27FC236}">
-                <a16:creationId xmlns:a16="http://schemas.microsoft.com/office/drawing/2014/main" id="{F45F4C21-837C-4D60-8BF3-E166BA88B481}"/>
-              </a:ext>
-            </a:extLst>
-          </p:cNvPr>
-          <p:cNvCxnSpPr>
-            <a:cxnSpLocks/>
-            <a:stCxn id="13" idx="0"/>
-            <a:endCxn id="37" idx="2"/>
-          </p:cNvCxnSpPr>
-          <p:nvPr/>
-        </p:nvCxnSpPr>
-        <p:spPr>
-          <a:xfrm flipV="1">
-            <a:off x="3350024" y="2482116"/>
-            <a:ext cx="0" cy="430403"/>
-          </a:xfrm>
-          <a:prstGeom prst="straightConnector1">
-            <a:avLst/>
-          </a:prstGeom>
-          <a:ln>
-            <a:tailEnd type="triangle"/>
-          </a:ln>
-        </p:spPr>
-        <p:style>
-          <a:lnRef idx="1">
-            <a:schemeClr val="accent1"/>
-          </a:lnRef>
-          <a:fillRef idx="0">
-            <a:schemeClr val="accent1"/>
-          </a:fillRef>
-          <a:effectRef idx="0">
-            <a:schemeClr val="accent1"/>
-          </a:effectRef>
-          <a:fontRef idx="minor">
-            <a:schemeClr val="tx1"/>
-          </a:fontRef>
-        </p:style>
-      </p:cxnSp>
       <p:cxnSp>
         <p:nvCxnSpPr>
           <p:cNvPr id="53" name="Gerade Verbindung mit Pfeil 52">
@@ -13800,7 +14085,7 @@
         <p:spPr>
           <a:xfrm flipH="1" flipV="1">
             <a:off x="1912820" y="1569665"/>
-            <a:ext cx="1437204" cy="430403"/>
+            <a:ext cx="1437204" cy="628782"/>
           </a:xfrm>
           <a:prstGeom prst="straightConnector1">
             <a:avLst/>
@@ -13877,7 +14162,7 @@
         </p:nvSpPr>
         <p:spPr>
           <a:xfrm>
-            <a:off x="3398426" y="4414497"/>
+            <a:off x="3456918" y="4087194"/>
             <a:ext cx="1471747" cy="215444"/>
           </a:xfrm>
           <a:prstGeom prst="rect">
@@ -13900,10 +14185,10 @@
       </p:sp>
       <p:sp>
         <p:nvSpPr>
-          <p:cNvPr id="17" name="Textfeld 16">
-            <a:extLst>
-              <a:ext uri="{FF2B5EF4-FFF2-40B4-BE49-F238E27FC236}">
-                <a16:creationId xmlns:a16="http://schemas.microsoft.com/office/drawing/2014/main" id="{DAB67392-0C58-4BEE-AADC-74FB5AAC8582}"/>
+          <p:cNvPr id="19" name="Textfeld 18">
+            <a:extLst>
+              <a:ext uri="{FF2B5EF4-FFF2-40B4-BE49-F238E27FC236}">
+                <a16:creationId xmlns:a16="http://schemas.microsoft.com/office/drawing/2014/main" id="{DA07E9C2-32CD-48F8-84A3-B149CE8F9704}"/>
               </a:ext>
             </a:extLst>
           </p:cNvPr>
@@ -13912,42 +14197,7 @@
         </p:nvSpPr>
         <p:spPr>
           <a:xfrm>
-            <a:off x="3398426" y="2611813"/>
-            <a:ext cx="1471747" cy="215444"/>
-          </a:xfrm>
-          <a:prstGeom prst="rect">
-            <a:avLst/>
-          </a:prstGeom>
-          <a:noFill/>
-        </p:spPr>
-        <p:txBody>
-          <a:bodyPr wrap="square" rtlCol="0">
-            <a:spAutoFit/>
-          </a:bodyPr>
-          <a:lstStyle/>
-          <a:p>
-            <a:r>
-              <a:rPr lang="de-DE" sz="800" dirty="0"/>
-              <a:t>1 x 1 x 1 x AD/RR</a:t>
-            </a:r>
-          </a:p>
-        </p:txBody>
-      </p:sp>
-      <p:sp>
-        <p:nvSpPr>
-          <p:cNvPr id="19" name="Textfeld 18">
-            <a:extLst>
-              <a:ext uri="{FF2B5EF4-FFF2-40B4-BE49-F238E27FC236}">
-                <a16:creationId xmlns:a16="http://schemas.microsoft.com/office/drawing/2014/main" id="{DA07E9C2-32CD-48F8-84A3-B149CE8F9704}"/>
-              </a:ext>
-            </a:extLst>
-          </p:cNvPr>
-          <p:cNvSpPr txBox="1"/>
-          <p:nvPr/>
-        </p:nvSpPr>
-        <p:spPr>
-          <a:xfrm>
-            <a:off x="3403470" y="3502046"/>
+            <a:off x="3350024" y="2921034"/>
             <a:ext cx="1471747" cy="215444"/>
           </a:xfrm>
           <a:prstGeom prst="rect">
@@ -14053,6 +14303,11 @@
           <a:prstGeom prst="rect">
             <a:avLst/>
           </a:prstGeom>
+          <a:solidFill>
+            <a:schemeClr val="accent4">
+              <a:lumMod val="75000"/>
+            </a:schemeClr>
+          </a:solidFill>
         </p:spPr>
         <p:style>
           <a:lnRef idx="2">
@@ -14317,6 +14572,11 @@
           <a:prstGeom prst="rect">
             <a:avLst/>
           </a:prstGeom>
+          <a:solidFill>
+            <a:schemeClr val="accent5">
+              <a:lumMod val="50000"/>
+            </a:schemeClr>
+          </a:solidFill>
         </p:spPr>
         <p:style>
           <a:lnRef idx="2">
@@ -14451,6 +14711,11 @@
           <a:prstGeom prst="rect">
             <a:avLst/>
           </a:prstGeom>
+          <a:solidFill>
+            <a:schemeClr val="accent5">
+              <a:lumMod val="50000"/>
+            </a:schemeClr>
+          </a:solidFill>
         </p:spPr>
         <p:style>
           <a:lnRef idx="2">
@@ -14542,6 +14807,11 @@
           <a:prstGeom prst="rect">
             <a:avLst/>
           </a:prstGeom>
+          <a:solidFill>
+            <a:schemeClr val="accent5">
+              <a:lumMod val="75000"/>
+            </a:schemeClr>
+          </a:solidFill>
         </p:spPr>
         <p:style>
           <a:lnRef idx="2">
@@ -14641,6 +14911,11 @@
           <a:prstGeom prst="rect">
             <a:avLst/>
           </a:prstGeom>
+          <a:solidFill>
+            <a:schemeClr val="accent5">
+              <a:lumMod val="75000"/>
+            </a:schemeClr>
+          </a:solidFill>
         </p:spPr>
         <p:style>
           <a:lnRef idx="2">
@@ -14775,6 +15050,11 @@
           <a:prstGeom prst="rect">
             <a:avLst/>
           </a:prstGeom>
+          <a:solidFill>
+            <a:schemeClr val="accent5">
+              <a:lumMod val="75000"/>
+            </a:schemeClr>
+          </a:solidFill>
         </p:spPr>
         <p:style>
           <a:lnRef idx="2">
@@ -15135,6 +15415,12 @@
           <a:prstGeom prst="rect">
             <a:avLst/>
           </a:prstGeom>
+          <a:solidFill>
+            <a:srgbClr val="00B050"/>
+          </a:solidFill>
+          <a:ln>
+            <a:noFill/>
+          </a:ln>
         </p:spPr>
         <p:style>
           <a:lnRef idx="2">
@@ -15269,6 +15555,9 @@
           <a:prstGeom prst="rect">
             <a:avLst/>
           </a:prstGeom>
+          <a:solidFill>
+            <a:srgbClr val="00B0F0"/>
+          </a:solidFill>
         </p:spPr>
         <p:style>
           <a:lnRef idx="2">
@@ -15408,6 +15697,9 @@
           <a:prstGeom prst="rect">
             <a:avLst/>
           </a:prstGeom>
+          <a:solidFill>
+            <a:srgbClr val="00B0F0"/>
+          </a:solidFill>
         </p:spPr>
         <p:style>
           <a:lnRef idx="2">
@@ -15742,6 +16034,11 @@
           <a:prstGeom prst="rect">
             <a:avLst/>
           </a:prstGeom>
+          <a:solidFill>
+            <a:schemeClr val="accent5">
+              <a:lumMod val="50000"/>
+            </a:schemeClr>
+          </a:solidFill>
         </p:spPr>
         <p:style>
           <a:lnRef idx="2">
@@ -15798,6 +16095,11 @@
           <a:prstGeom prst="rect">
             <a:avLst/>
           </a:prstGeom>
+          <a:solidFill>
+            <a:schemeClr val="accent5">
+              <a:lumMod val="50000"/>
+            </a:schemeClr>
+          </a:solidFill>
         </p:spPr>
         <p:style>
           <a:lnRef idx="2">
@@ -15854,6 +16156,11 @@
           <a:prstGeom prst="rect">
             <a:avLst/>
           </a:prstGeom>
+          <a:solidFill>
+            <a:schemeClr val="accent5">
+              <a:lumMod val="50000"/>
+            </a:schemeClr>
+          </a:solidFill>
         </p:spPr>
         <p:style>
           <a:lnRef idx="2">
@@ -16651,6 +16958,11 @@
           <a:prstGeom prst="rect">
             <a:avLst/>
           </a:prstGeom>
+          <a:solidFill>
+            <a:schemeClr val="accent4">
+              <a:lumMod val="75000"/>
+            </a:schemeClr>
+          </a:solidFill>
         </p:spPr>
         <p:style>
           <a:lnRef idx="2">
@@ -16717,6 +17029,11 @@
           <a:prstGeom prst="rect">
             <a:avLst/>
           </a:prstGeom>
+          <a:solidFill>
+            <a:schemeClr val="accent4">
+              <a:lumMod val="75000"/>
+            </a:schemeClr>
+          </a:solidFill>
         </p:spPr>
         <p:style>
           <a:lnRef idx="2">
@@ -16826,6 +17143,9 @@
           <a:prstGeom prst="ellipse">
             <a:avLst/>
           </a:prstGeom>
+          <a:solidFill>
+            <a:srgbClr val="C00000"/>
+          </a:solidFill>
         </p:spPr>
         <p:style>
           <a:lnRef idx="2">
@@ -17085,7 +17405,7 @@
         </p:nvSpPr>
         <p:spPr>
           <a:xfrm>
-            <a:off x="3566318" y="3154551"/>
+            <a:off x="3462383" y="3104435"/>
             <a:ext cx="856325" cy="369332"/>
           </a:xfrm>
           <a:prstGeom prst="rect">
@@ -17126,6 +17446,11 @@
           <a:prstGeom prst="rect">
             <a:avLst/>
           </a:prstGeom>
+          <a:solidFill>
+            <a:schemeClr val="accent4">
+              <a:lumMod val="75000"/>
+            </a:schemeClr>
+          </a:solidFill>
         </p:spPr>
         <p:style>
           <a:lnRef idx="2">
@@ -17192,6 +17517,11 @@
           <a:prstGeom prst="rect">
             <a:avLst/>
           </a:prstGeom>
+          <a:solidFill>
+            <a:schemeClr val="accent4">
+              <a:lumMod val="75000"/>
+            </a:schemeClr>
+          </a:solidFill>
         </p:spPr>
         <p:style>
           <a:lnRef idx="2">
@@ -17301,6 +17631,9 @@
           <a:prstGeom prst="ellipse">
             <a:avLst/>
           </a:prstGeom>
+          <a:solidFill>
+            <a:srgbClr val="C00000"/>
+          </a:solidFill>
         </p:spPr>
         <p:style>
           <a:lnRef idx="2">
@@ -17566,6 +17899,11 @@
           <a:prstGeom prst="rect">
             <a:avLst/>
           </a:prstGeom>
+          <a:solidFill>
+            <a:schemeClr val="accent4">
+              <a:lumMod val="75000"/>
+            </a:schemeClr>
+          </a:solidFill>
         </p:spPr>
         <p:style>
           <a:lnRef idx="2">
@@ -17693,6 +18031,2045 @@
     <p:extLst>
       <p:ext uri="{BB962C8B-B14F-4D97-AF65-F5344CB8AC3E}">
         <p14:creationId xmlns:p14="http://schemas.microsoft.com/office/powerpoint/2010/main" val="2090266783"/>
+      </p:ext>
+    </p:extLst>
+  </p:cSld>
+  <p:clrMapOvr>
+    <a:masterClrMapping/>
+  </p:clrMapOvr>
+</p:sld>
+</file>
+
+<file path=ppt/slides/slide7.xml><?xml version="1.0" encoding="utf-8"?>
+<p:sld xmlns:a="http://schemas.openxmlformats.org/drawingml/2006/main" xmlns:r="http://schemas.openxmlformats.org/officeDocument/2006/relationships" xmlns:p="http://schemas.openxmlformats.org/presentationml/2006/main">
+  <p:cSld>
+    <p:spTree>
+      <p:nvGrpSpPr>
+        <p:cNvPr id="1" name=""/>
+        <p:cNvGrpSpPr/>
+        <p:nvPr/>
+      </p:nvGrpSpPr>
+      <p:grpSpPr>
+        <a:xfrm>
+          <a:off x="0" y="0"/>
+          <a:ext cx="0" cy="0"/>
+          <a:chOff x="0" y="0"/>
+          <a:chExt cx="0" cy="0"/>
+        </a:xfrm>
+      </p:grpSpPr>
+      <p:sp>
+        <p:nvSpPr>
+          <p:cNvPr id="2" name="Textfeld 1">
+            <a:extLst>
+              <a:ext uri="{FF2B5EF4-FFF2-40B4-BE49-F238E27FC236}">
+                <a16:creationId xmlns:a16="http://schemas.microsoft.com/office/drawing/2014/main" id="{EBF60DE1-C845-4005-BA5F-F716275909FB}"/>
+              </a:ext>
+            </a:extLst>
+          </p:cNvPr>
+          <p:cNvSpPr txBox="1"/>
+          <p:nvPr/>
+        </p:nvSpPr>
+        <p:spPr>
+          <a:xfrm>
+            <a:off x="387626" y="367747"/>
+            <a:ext cx="3333348" cy="369332"/>
+          </a:xfrm>
+          <a:prstGeom prst="rect">
+            <a:avLst/>
+          </a:prstGeom>
+          <a:noFill/>
+        </p:spPr>
+        <p:txBody>
+          <a:bodyPr wrap="none" rtlCol="0">
+            <a:spAutoFit/>
+          </a:bodyPr>
+          <a:lstStyle/>
+          <a:p>
+            <a:r>
+              <a:rPr lang="de-DE" dirty="0"/>
+              <a:t>All-</a:t>
+            </a:r>
+            <a:r>
+              <a:rPr lang="de-DE" dirty="0" err="1"/>
+              <a:t>Convolutional</a:t>
+            </a:r>
+            <a:r>
+              <a:rPr lang="de-DE" dirty="0"/>
+              <a:t> </a:t>
+            </a:r>
+            <a:r>
+              <a:rPr lang="de-DE" dirty="0" err="1"/>
+              <a:t>Neural</a:t>
+            </a:r>
+            <a:r>
+              <a:rPr lang="de-DE" dirty="0"/>
+              <a:t> Network</a:t>
+            </a:r>
+          </a:p>
+        </p:txBody>
+      </p:sp>
+      <p:sp>
+        <p:nvSpPr>
+          <p:cNvPr id="3" name="Rechteck 2">
+            <a:extLst>
+              <a:ext uri="{FF2B5EF4-FFF2-40B4-BE49-F238E27FC236}">
+                <a16:creationId xmlns:a16="http://schemas.microsoft.com/office/drawing/2014/main" id="{ECAF88A0-2BD3-419D-ABDD-5359B538ACB1}"/>
+              </a:ext>
+            </a:extLst>
+          </p:cNvPr>
+          <p:cNvSpPr/>
+          <p:nvPr/>
+        </p:nvSpPr>
+        <p:spPr>
+          <a:xfrm>
+            <a:off x="2247247" y="1405727"/>
+            <a:ext cx="981920" cy="482048"/>
+          </a:xfrm>
+          <a:prstGeom prst="rect">
+            <a:avLst/>
+          </a:prstGeom>
+          <a:solidFill>
+            <a:schemeClr val="accent4">
+              <a:lumMod val="75000"/>
+            </a:schemeClr>
+          </a:solidFill>
+        </p:spPr>
+        <p:style>
+          <a:lnRef idx="2">
+            <a:schemeClr val="accent1">
+              <a:shade val="50000"/>
+            </a:schemeClr>
+          </a:lnRef>
+          <a:fillRef idx="1">
+            <a:schemeClr val="accent1"/>
+          </a:fillRef>
+          <a:effectRef idx="0">
+            <a:schemeClr val="accent1"/>
+          </a:effectRef>
+          <a:fontRef idx="minor">
+            <a:schemeClr val="lt1"/>
+          </a:fontRef>
+        </p:style>
+        <p:txBody>
+          <a:bodyPr rtlCol="0" anchor="ctr"/>
+          <a:lstStyle/>
+          <a:p>
+            <a:pPr algn="ctr"/>
+            <a:r>
+              <a:rPr lang="de-DE" sz="800" dirty="0" err="1"/>
+              <a:t>Conv</a:t>
+            </a:r>
+            <a:endParaRPr lang="de-DE" sz="800" dirty="0"/>
+          </a:p>
+          <a:p>
+            <a:pPr algn="ctr"/>
+            <a:r>
+              <a:rPr lang="de-DE" sz="800" dirty="0"/>
+              <a:t>3x3, </a:t>
+            </a:r>
+          </a:p>
+          <a:p>
+            <a:pPr algn="ctr"/>
+            <a:r>
+              <a:rPr lang="de-DE" sz="800" dirty="0"/>
+              <a:t>Filter=96 </a:t>
+            </a:r>
+            <a:r>
+              <a:rPr lang="de-DE" sz="800" dirty="0" err="1"/>
+              <a:t>padding</a:t>
+            </a:r>
+            <a:r>
+              <a:rPr lang="de-DE" sz="800" dirty="0"/>
+              <a:t>=SAME</a:t>
+            </a:r>
+            <a:endParaRPr lang="de-DE" sz="1000" dirty="0"/>
+          </a:p>
+        </p:txBody>
+      </p:sp>
+      <p:sp>
+        <p:nvSpPr>
+          <p:cNvPr id="4" name="Rechteck 3">
+            <a:extLst>
+              <a:ext uri="{FF2B5EF4-FFF2-40B4-BE49-F238E27FC236}">
+                <a16:creationId xmlns:a16="http://schemas.microsoft.com/office/drawing/2014/main" id="{16FFCC3B-2C4E-4755-B782-159D6A6952C8}"/>
+              </a:ext>
+            </a:extLst>
+          </p:cNvPr>
+          <p:cNvSpPr/>
+          <p:nvPr/>
+        </p:nvSpPr>
+        <p:spPr>
+          <a:xfrm>
+            <a:off x="3899878" y="1405727"/>
+            <a:ext cx="981920" cy="482048"/>
+          </a:xfrm>
+          <a:prstGeom prst="rect">
+            <a:avLst/>
+          </a:prstGeom>
+          <a:solidFill>
+            <a:schemeClr val="accent4">
+              <a:lumMod val="75000"/>
+            </a:schemeClr>
+          </a:solidFill>
+        </p:spPr>
+        <p:style>
+          <a:lnRef idx="2">
+            <a:schemeClr val="accent1">
+              <a:shade val="50000"/>
+            </a:schemeClr>
+          </a:lnRef>
+          <a:fillRef idx="1">
+            <a:schemeClr val="accent1"/>
+          </a:fillRef>
+          <a:effectRef idx="0">
+            <a:schemeClr val="accent1"/>
+          </a:effectRef>
+          <a:fontRef idx="minor">
+            <a:schemeClr val="lt1"/>
+          </a:fontRef>
+        </p:style>
+        <p:txBody>
+          <a:bodyPr rtlCol="0" anchor="ctr"/>
+          <a:lstStyle/>
+          <a:p>
+            <a:pPr algn="ctr"/>
+            <a:r>
+              <a:rPr lang="de-DE" sz="800" dirty="0" err="1"/>
+              <a:t>Conv</a:t>
+            </a:r>
+            <a:endParaRPr lang="de-DE" sz="800" dirty="0"/>
+          </a:p>
+          <a:p>
+            <a:pPr algn="ctr"/>
+            <a:r>
+              <a:rPr lang="de-DE" sz="800" dirty="0"/>
+              <a:t>3x3, </a:t>
+            </a:r>
+          </a:p>
+          <a:p>
+            <a:pPr algn="ctr"/>
+            <a:r>
+              <a:rPr lang="de-DE" sz="800" dirty="0"/>
+              <a:t>Filter=96 </a:t>
+            </a:r>
+            <a:r>
+              <a:rPr lang="de-DE" sz="800" dirty="0" err="1"/>
+              <a:t>padding</a:t>
+            </a:r>
+            <a:r>
+              <a:rPr lang="de-DE" sz="800" dirty="0"/>
+              <a:t>=SAME</a:t>
+            </a:r>
+            <a:endParaRPr lang="de-DE" sz="1000" dirty="0"/>
+          </a:p>
+        </p:txBody>
+      </p:sp>
+      <p:sp>
+        <p:nvSpPr>
+          <p:cNvPr id="5" name="Rechteck 4">
+            <a:extLst>
+              <a:ext uri="{FF2B5EF4-FFF2-40B4-BE49-F238E27FC236}">
+                <a16:creationId xmlns:a16="http://schemas.microsoft.com/office/drawing/2014/main" id="{3803B5F5-E42B-4FAE-9D83-F24842F15243}"/>
+              </a:ext>
+            </a:extLst>
+          </p:cNvPr>
+          <p:cNvSpPr/>
+          <p:nvPr/>
+        </p:nvSpPr>
+        <p:spPr>
+          <a:xfrm>
+            <a:off x="594617" y="1405727"/>
+            <a:ext cx="981920" cy="482048"/>
+          </a:xfrm>
+          <a:prstGeom prst="rect">
+            <a:avLst/>
+          </a:prstGeom>
+        </p:spPr>
+        <p:style>
+          <a:lnRef idx="2">
+            <a:schemeClr val="accent1">
+              <a:shade val="50000"/>
+            </a:schemeClr>
+          </a:lnRef>
+          <a:fillRef idx="1">
+            <a:schemeClr val="accent1"/>
+          </a:fillRef>
+          <a:effectRef idx="0">
+            <a:schemeClr val="accent1"/>
+          </a:effectRef>
+          <a:fontRef idx="minor">
+            <a:schemeClr val="lt1"/>
+          </a:fontRef>
+        </p:style>
+        <p:txBody>
+          <a:bodyPr rtlCol="0" anchor="ctr"/>
+          <a:lstStyle/>
+          <a:p>
+            <a:pPr algn="ctr"/>
+            <a:r>
+              <a:rPr lang="de-DE" sz="800" dirty="0"/>
+              <a:t>Eingabe</a:t>
+            </a:r>
+            <a:endParaRPr lang="de-DE" sz="1000" dirty="0"/>
+          </a:p>
+        </p:txBody>
+      </p:sp>
+      <p:cxnSp>
+        <p:nvCxnSpPr>
+          <p:cNvPr id="7" name="Gerade Verbindung mit Pfeil 6">
+            <a:extLst>
+              <a:ext uri="{FF2B5EF4-FFF2-40B4-BE49-F238E27FC236}">
+                <a16:creationId xmlns:a16="http://schemas.microsoft.com/office/drawing/2014/main" id="{0D22E750-7587-4FC7-91ED-C0D5710865AD}"/>
+              </a:ext>
+            </a:extLst>
+          </p:cNvPr>
+          <p:cNvCxnSpPr>
+            <a:cxnSpLocks/>
+            <a:stCxn id="5" idx="3"/>
+            <a:endCxn id="3" idx="1"/>
+          </p:cNvCxnSpPr>
+          <p:nvPr/>
+        </p:nvCxnSpPr>
+        <p:spPr>
+          <a:xfrm>
+            <a:off x="1576537" y="1646751"/>
+            <a:ext cx="670710" cy="0"/>
+          </a:xfrm>
+          <a:prstGeom prst="straightConnector1">
+            <a:avLst/>
+          </a:prstGeom>
+          <a:ln>
+            <a:tailEnd type="triangle"/>
+          </a:ln>
+        </p:spPr>
+        <p:style>
+          <a:lnRef idx="1">
+            <a:schemeClr val="accent1"/>
+          </a:lnRef>
+          <a:fillRef idx="0">
+            <a:schemeClr val="accent1"/>
+          </a:fillRef>
+          <a:effectRef idx="0">
+            <a:schemeClr val="accent1"/>
+          </a:effectRef>
+          <a:fontRef idx="minor">
+            <a:schemeClr val="tx1"/>
+          </a:fontRef>
+        </p:style>
+      </p:cxnSp>
+      <p:cxnSp>
+        <p:nvCxnSpPr>
+          <p:cNvPr id="10" name="Gerade Verbindung mit Pfeil 9">
+            <a:extLst>
+              <a:ext uri="{FF2B5EF4-FFF2-40B4-BE49-F238E27FC236}">
+                <a16:creationId xmlns:a16="http://schemas.microsoft.com/office/drawing/2014/main" id="{1BBEC985-662C-4126-B442-F9E1FA1C7CFE}"/>
+              </a:ext>
+            </a:extLst>
+          </p:cNvPr>
+          <p:cNvCxnSpPr>
+            <a:cxnSpLocks/>
+            <a:stCxn id="3" idx="3"/>
+            <a:endCxn id="4" idx="1"/>
+          </p:cNvCxnSpPr>
+          <p:nvPr/>
+        </p:nvCxnSpPr>
+        <p:spPr>
+          <a:xfrm>
+            <a:off x="3229167" y="1646751"/>
+            <a:ext cx="670711" cy="0"/>
+          </a:xfrm>
+          <a:prstGeom prst="straightConnector1">
+            <a:avLst/>
+          </a:prstGeom>
+          <a:ln>
+            <a:tailEnd type="triangle"/>
+          </a:ln>
+        </p:spPr>
+        <p:style>
+          <a:lnRef idx="1">
+            <a:schemeClr val="accent1"/>
+          </a:lnRef>
+          <a:fillRef idx="0">
+            <a:schemeClr val="accent1"/>
+          </a:fillRef>
+          <a:effectRef idx="0">
+            <a:schemeClr val="accent1"/>
+          </a:effectRef>
+          <a:fontRef idx="minor">
+            <a:schemeClr val="tx1"/>
+          </a:fontRef>
+        </p:style>
+      </p:cxnSp>
+      <p:sp>
+        <p:nvSpPr>
+          <p:cNvPr id="12" name="Textfeld 11">
+            <a:extLst>
+              <a:ext uri="{FF2B5EF4-FFF2-40B4-BE49-F238E27FC236}">
+                <a16:creationId xmlns:a16="http://schemas.microsoft.com/office/drawing/2014/main" id="{A271DACD-4B1F-4419-A32C-9EBD0DBB959B}"/>
+              </a:ext>
+            </a:extLst>
+          </p:cNvPr>
+          <p:cNvSpPr txBox="1"/>
+          <p:nvPr/>
+        </p:nvSpPr>
+        <p:spPr>
+          <a:xfrm>
+            <a:off x="1571895" y="1656943"/>
+            <a:ext cx="679994" cy="230832"/>
+          </a:xfrm>
+          <a:prstGeom prst="rect">
+            <a:avLst/>
+          </a:prstGeom>
+          <a:noFill/>
+        </p:spPr>
+        <p:txBody>
+          <a:bodyPr wrap="none" rtlCol="0">
+            <a:spAutoFit/>
+          </a:bodyPr>
+          <a:lstStyle/>
+          <a:p>
+            <a:r>
+              <a:rPr lang="de-DE" sz="900" dirty="0"/>
+              <a:t>8x84x84x1</a:t>
+            </a:r>
+          </a:p>
+        </p:txBody>
+      </p:sp>
+      <p:sp>
+        <p:nvSpPr>
+          <p:cNvPr id="13" name="Textfeld 12">
+            <a:extLst>
+              <a:ext uri="{FF2B5EF4-FFF2-40B4-BE49-F238E27FC236}">
+                <a16:creationId xmlns:a16="http://schemas.microsoft.com/office/drawing/2014/main" id="{F5B2496B-1269-4EC7-9FCC-CD10E15D5563}"/>
+              </a:ext>
+            </a:extLst>
+          </p:cNvPr>
+          <p:cNvSpPr txBox="1"/>
+          <p:nvPr/>
+        </p:nvSpPr>
+        <p:spPr>
+          <a:xfrm>
+            <a:off x="3195671" y="1656943"/>
+            <a:ext cx="737702" cy="230832"/>
+          </a:xfrm>
+          <a:prstGeom prst="rect">
+            <a:avLst/>
+          </a:prstGeom>
+          <a:noFill/>
+        </p:spPr>
+        <p:txBody>
+          <a:bodyPr wrap="none" rtlCol="0">
+            <a:spAutoFit/>
+          </a:bodyPr>
+          <a:lstStyle/>
+          <a:p>
+            <a:r>
+              <a:rPr lang="de-DE" sz="900" dirty="0"/>
+              <a:t>8x84x84x96</a:t>
+            </a:r>
+          </a:p>
+        </p:txBody>
+      </p:sp>
+      <p:sp>
+        <p:nvSpPr>
+          <p:cNvPr id="14" name="Rechteck 13">
+            <a:extLst>
+              <a:ext uri="{FF2B5EF4-FFF2-40B4-BE49-F238E27FC236}">
+                <a16:creationId xmlns:a16="http://schemas.microsoft.com/office/drawing/2014/main" id="{4930A23E-9E4F-44FE-A042-D5C848E20AE1}"/>
+              </a:ext>
+            </a:extLst>
+          </p:cNvPr>
+          <p:cNvSpPr/>
+          <p:nvPr/>
+        </p:nvSpPr>
+        <p:spPr>
+          <a:xfrm>
+            <a:off x="5552509" y="1402582"/>
+            <a:ext cx="981920" cy="482048"/>
+          </a:xfrm>
+          <a:prstGeom prst="rect">
+            <a:avLst/>
+          </a:prstGeom>
+          <a:solidFill>
+            <a:schemeClr val="accent4">
+              <a:lumMod val="75000"/>
+            </a:schemeClr>
+          </a:solidFill>
+        </p:spPr>
+        <p:style>
+          <a:lnRef idx="2">
+            <a:schemeClr val="accent1">
+              <a:shade val="50000"/>
+            </a:schemeClr>
+          </a:lnRef>
+          <a:fillRef idx="1">
+            <a:schemeClr val="accent1"/>
+          </a:fillRef>
+          <a:effectRef idx="0">
+            <a:schemeClr val="accent1"/>
+          </a:effectRef>
+          <a:fontRef idx="minor">
+            <a:schemeClr val="lt1"/>
+          </a:fontRef>
+        </p:style>
+        <p:txBody>
+          <a:bodyPr rtlCol="0" anchor="ctr"/>
+          <a:lstStyle/>
+          <a:p>
+            <a:pPr algn="ctr"/>
+            <a:r>
+              <a:rPr lang="de-DE" sz="800" dirty="0" err="1"/>
+              <a:t>Conv</a:t>
+            </a:r>
+            <a:endParaRPr lang="de-DE" sz="800" dirty="0"/>
+          </a:p>
+          <a:p>
+            <a:pPr algn="ctr"/>
+            <a:r>
+              <a:rPr lang="de-DE" sz="800" dirty="0"/>
+              <a:t>3x3, </a:t>
+            </a:r>
+          </a:p>
+          <a:p>
+            <a:pPr algn="ctr"/>
+            <a:r>
+              <a:rPr lang="de-DE" sz="800" dirty="0"/>
+              <a:t>Filter=96, </a:t>
+            </a:r>
+            <a:r>
+              <a:rPr lang="de-DE" sz="800" dirty="0" err="1"/>
+              <a:t>strides</a:t>
+            </a:r>
+            <a:r>
+              <a:rPr lang="de-DE" sz="800" dirty="0"/>
+              <a:t>=2</a:t>
+            </a:r>
+            <a:endParaRPr lang="de-DE" sz="1000" dirty="0"/>
+          </a:p>
+        </p:txBody>
+      </p:sp>
+      <p:cxnSp>
+        <p:nvCxnSpPr>
+          <p:cNvPr id="15" name="Gerade Verbindung mit Pfeil 14">
+            <a:extLst>
+              <a:ext uri="{FF2B5EF4-FFF2-40B4-BE49-F238E27FC236}">
+                <a16:creationId xmlns:a16="http://schemas.microsoft.com/office/drawing/2014/main" id="{A3B29F24-BCB2-401C-AE6C-D246CDA3C394}"/>
+              </a:ext>
+            </a:extLst>
+          </p:cNvPr>
+          <p:cNvCxnSpPr>
+            <a:cxnSpLocks/>
+            <a:endCxn id="14" idx="1"/>
+          </p:cNvCxnSpPr>
+          <p:nvPr/>
+        </p:nvCxnSpPr>
+        <p:spPr>
+          <a:xfrm>
+            <a:off x="4881798" y="1643606"/>
+            <a:ext cx="670711" cy="0"/>
+          </a:xfrm>
+          <a:prstGeom prst="straightConnector1">
+            <a:avLst/>
+          </a:prstGeom>
+          <a:ln>
+            <a:tailEnd type="triangle"/>
+          </a:ln>
+        </p:spPr>
+        <p:style>
+          <a:lnRef idx="1">
+            <a:schemeClr val="accent1"/>
+          </a:lnRef>
+          <a:fillRef idx="0">
+            <a:schemeClr val="accent1"/>
+          </a:fillRef>
+          <a:effectRef idx="0">
+            <a:schemeClr val="accent1"/>
+          </a:effectRef>
+          <a:fontRef idx="minor">
+            <a:schemeClr val="tx1"/>
+          </a:fontRef>
+        </p:style>
+      </p:cxnSp>
+      <p:sp>
+        <p:nvSpPr>
+          <p:cNvPr id="16" name="Textfeld 15">
+            <a:extLst>
+              <a:ext uri="{FF2B5EF4-FFF2-40B4-BE49-F238E27FC236}">
+                <a16:creationId xmlns:a16="http://schemas.microsoft.com/office/drawing/2014/main" id="{E049758D-A832-4D7E-A336-B4728D977DF4}"/>
+              </a:ext>
+            </a:extLst>
+          </p:cNvPr>
+          <p:cNvSpPr txBox="1"/>
+          <p:nvPr/>
+        </p:nvSpPr>
+        <p:spPr>
+          <a:xfrm>
+            <a:off x="4848303" y="1658893"/>
+            <a:ext cx="737702" cy="230832"/>
+          </a:xfrm>
+          <a:prstGeom prst="rect">
+            <a:avLst/>
+          </a:prstGeom>
+          <a:noFill/>
+        </p:spPr>
+        <p:txBody>
+          <a:bodyPr wrap="none" rtlCol="0">
+            <a:spAutoFit/>
+          </a:bodyPr>
+          <a:lstStyle/>
+          <a:p>
+            <a:r>
+              <a:rPr lang="de-DE" sz="900" dirty="0"/>
+              <a:t>8x84x84x96</a:t>
+            </a:r>
+          </a:p>
+        </p:txBody>
+      </p:sp>
+      <p:sp>
+        <p:nvSpPr>
+          <p:cNvPr id="17" name="Rechteck 16">
+            <a:extLst>
+              <a:ext uri="{FF2B5EF4-FFF2-40B4-BE49-F238E27FC236}">
+                <a16:creationId xmlns:a16="http://schemas.microsoft.com/office/drawing/2014/main" id="{06939E6D-87C0-4649-AD7A-F9A8336A9089}"/>
+              </a:ext>
+            </a:extLst>
+          </p:cNvPr>
+          <p:cNvSpPr/>
+          <p:nvPr/>
+        </p:nvSpPr>
+        <p:spPr>
+          <a:xfrm>
+            <a:off x="2247246" y="2309236"/>
+            <a:ext cx="981920" cy="482048"/>
+          </a:xfrm>
+          <a:prstGeom prst="rect">
+            <a:avLst/>
+          </a:prstGeom>
+          <a:solidFill>
+            <a:schemeClr val="accent4">
+              <a:lumMod val="75000"/>
+            </a:schemeClr>
+          </a:solidFill>
+        </p:spPr>
+        <p:style>
+          <a:lnRef idx="2">
+            <a:schemeClr val="accent1">
+              <a:shade val="50000"/>
+            </a:schemeClr>
+          </a:lnRef>
+          <a:fillRef idx="1">
+            <a:schemeClr val="accent1"/>
+          </a:fillRef>
+          <a:effectRef idx="0">
+            <a:schemeClr val="accent1"/>
+          </a:effectRef>
+          <a:fontRef idx="minor">
+            <a:schemeClr val="lt1"/>
+          </a:fontRef>
+        </p:style>
+        <p:txBody>
+          <a:bodyPr rtlCol="0" anchor="ctr"/>
+          <a:lstStyle/>
+          <a:p>
+            <a:pPr algn="ctr"/>
+            <a:r>
+              <a:rPr lang="de-DE" sz="800" dirty="0" err="1"/>
+              <a:t>Conv</a:t>
+            </a:r>
+            <a:endParaRPr lang="de-DE" sz="800" dirty="0"/>
+          </a:p>
+          <a:p>
+            <a:pPr algn="ctr"/>
+            <a:r>
+              <a:rPr lang="de-DE" sz="800" dirty="0"/>
+              <a:t>3x3, </a:t>
+            </a:r>
+          </a:p>
+          <a:p>
+            <a:pPr algn="ctr"/>
+            <a:r>
+              <a:rPr lang="de-DE" sz="800" dirty="0"/>
+              <a:t>Filter=192 </a:t>
+            </a:r>
+            <a:r>
+              <a:rPr lang="de-DE" sz="800" dirty="0" err="1"/>
+              <a:t>padding</a:t>
+            </a:r>
+            <a:r>
+              <a:rPr lang="de-DE" sz="800" dirty="0"/>
+              <a:t>=SAME</a:t>
+            </a:r>
+            <a:endParaRPr lang="de-DE" sz="1000" dirty="0"/>
+          </a:p>
+        </p:txBody>
+      </p:sp>
+      <p:sp>
+        <p:nvSpPr>
+          <p:cNvPr id="18" name="Rechteck 17">
+            <a:extLst>
+              <a:ext uri="{FF2B5EF4-FFF2-40B4-BE49-F238E27FC236}">
+                <a16:creationId xmlns:a16="http://schemas.microsoft.com/office/drawing/2014/main" id="{447E8DA1-46AA-4ADF-B49B-CA71133FDE77}"/>
+              </a:ext>
+            </a:extLst>
+          </p:cNvPr>
+          <p:cNvSpPr/>
+          <p:nvPr/>
+        </p:nvSpPr>
+        <p:spPr>
+          <a:xfrm>
+            <a:off x="3899878" y="2312381"/>
+            <a:ext cx="981920" cy="482048"/>
+          </a:xfrm>
+          <a:prstGeom prst="rect">
+            <a:avLst/>
+          </a:prstGeom>
+          <a:solidFill>
+            <a:schemeClr val="accent4">
+              <a:lumMod val="75000"/>
+            </a:schemeClr>
+          </a:solidFill>
+        </p:spPr>
+        <p:style>
+          <a:lnRef idx="2">
+            <a:schemeClr val="accent1">
+              <a:shade val="50000"/>
+            </a:schemeClr>
+          </a:lnRef>
+          <a:fillRef idx="1">
+            <a:schemeClr val="accent1"/>
+          </a:fillRef>
+          <a:effectRef idx="0">
+            <a:schemeClr val="accent1"/>
+          </a:effectRef>
+          <a:fontRef idx="minor">
+            <a:schemeClr val="lt1"/>
+          </a:fontRef>
+        </p:style>
+        <p:txBody>
+          <a:bodyPr rtlCol="0" anchor="ctr"/>
+          <a:lstStyle/>
+          <a:p>
+            <a:pPr algn="ctr"/>
+            <a:r>
+              <a:rPr lang="de-DE" sz="800" dirty="0" err="1"/>
+              <a:t>Conv</a:t>
+            </a:r>
+            <a:endParaRPr lang="de-DE" sz="800" dirty="0"/>
+          </a:p>
+          <a:p>
+            <a:pPr algn="ctr"/>
+            <a:r>
+              <a:rPr lang="de-DE" sz="800" dirty="0"/>
+              <a:t>3x3, </a:t>
+            </a:r>
+          </a:p>
+          <a:p>
+            <a:pPr algn="ctr"/>
+            <a:r>
+              <a:rPr lang="de-DE" sz="800" dirty="0"/>
+              <a:t>Filter=192 </a:t>
+            </a:r>
+            <a:r>
+              <a:rPr lang="de-DE" sz="800" dirty="0" err="1"/>
+              <a:t>padding</a:t>
+            </a:r>
+            <a:r>
+              <a:rPr lang="de-DE" sz="800" dirty="0"/>
+              <a:t>=SAME</a:t>
+            </a:r>
+            <a:endParaRPr lang="de-DE" sz="1000" dirty="0"/>
+          </a:p>
+        </p:txBody>
+      </p:sp>
+      <p:cxnSp>
+        <p:nvCxnSpPr>
+          <p:cNvPr id="19" name="Gerade Verbindung mit Pfeil 18">
+            <a:extLst>
+              <a:ext uri="{FF2B5EF4-FFF2-40B4-BE49-F238E27FC236}">
+                <a16:creationId xmlns:a16="http://schemas.microsoft.com/office/drawing/2014/main" id="{584B98C1-D928-4FE4-9C9C-5404FC74CA56}"/>
+              </a:ext>
+            </a:extLst>
+          </p:cNvPr>
+          <p:cNvCxnSpPr>
+            <a:cxnSpLocks/>
+            <a:stCxn id="17" idx="3"/>
+            <a:endCxn id="18" idx="1"/>
+          </p:cNvCxnSpPr>
+          <p:nvPr/>
+        </p:nvCxnSpPr>
+        <p:spPr>
+          <a:xfrm>
+            <a:off x="3229166" y="2550260"/>
+            <a:ext cx="670712" cy="3145"/>
+          </a:xfrm>
+          <a:prstGeom prst="straightConnector1">
+            <a:avLst/>
+          </a:prstGeom>
+          <a:ln>
+            <a:tailEnd type="triangle"/>
+          </a:ln>
+        </p:spPr>
+        <p:style>
+          <a:lnRef idx="1">
+            <a:schemeClr val="accent1"/>
+          </a:lnRef>
+          <a:fillRef idx="0">
+            <a:schemeClr val="accent1"/>
+          </a:fillRef>
+          <a:effectRef idx="0">
+            <a:schemeClr val="accent1"/>
+          </a:effectRef>
+          <a:fontRef idx="minor">
+            <a:schemeClr val="tx1"/>
+          </a:fontRef>
+        </p:style>
+      </p:cxnSp>
+      <p:sp>
+        <p:nvSpPr>
+          <p:cNvPr id="20" name="Textfeld 19">
+            <a:extLst>
+              <a:ext uri="{FF2B5EF4-FFF2-40B4-BE49-F238E27FC236}">
+                <a16:creationId xmlns:a16="http://schemas.microsoft.com/office/drawing/2014/main" id="{49385B67-7449-4871-82D4-9DB9A48BC0DF}"/>
+              </a:ext>
+            </a:extLst>
+          </p:cNvPr>
+          <p:cNvSpPr txBox="1"/>
+          <p:nvPr/>
+        </p:nvSpPr>
+        <p:spPr>
+          <a:xfrm>
+            <a:off x="3166816" y="2563275"/>
+            <a:ext cx="795411" cy="230832"/>
+          </a:xfrm>
+          <a:prstGeom prst="rect">
+            <a:avLst/>
+          </a:prstGeom>
+          <a:noFill/>
+        </p:spPr>
+        <p:txBody>
+          <a:bodyPr wrap="none" rtlCol="0">
+            <a:spAutoFit/>
+          </a:bodyPr>
+          <a:lstStyle/>
+          <a:p>
+            <a:r>
+              <a:rPr lang="de-DE" sz="900" dirty="0"/>
+              <a:t>8x41x41x192</a:t>
+            </a:r>
+          </a:p>
+        </p:txBody>
+      </p:sp>
+      <p:sp>
+        <p:nvSpPr>
+          <p:cNvPr id="21" name="Rechteck 20">
+            <a:extLst>
+              <a:ext uri="{FF2B5EF4-FFF2-40B4-BE49-F238E27FC236}">
+                <a16:creationId xmlns:a16="http://schemas.microsoft.com/office/drawing/2014/main" id="{1B5EE315-B575-4211-A025-D95A0CC1DB6E}"/>
+              </a:ext>
+            </a:extLst>
+          </p:cNvPr>
+          <p:cNvSpPr/>
+          <p:nvPr/>
+        </p:nvSpPr>
+        <p:spPr>
+          <a:xfrm>
+            <a:off x="5552509" y="2309236"/>
+            <a:ext cx="981920" cy="482048"/>
+          </a:xfrm>
+          <a:prstGeom prst="rect">
+            <a:avLst/>
+          </a:prstGeom>
+          <a:solidFill>
+            <a:schemeClr val="accent4">
+              <a:lumMod val="75000"/>
+            </a:schemeClr>
+          </a:solidFill>
+        </p:spPr>
+        <p:style>
+          <a:lnRef idx="2">
+            <a:schemeClr val="accent1">
+              <a:shade val="50000"/>
+            </a:schemeClr>
+          </a:lnRef>
+          <a:fillRef idx="1">
+            <a:schemeClr val="accent1"/>
+          </a:fillRef>
+          <a:effectRef idx="0">
+            <a:schemeClr val="accent1"/>
+          </a:effectRef>
+          <a:fontRef idx="minor">
+            <a:schemeClr val="lt1"/>
+          </a:fontRef>
+        </p:style>
+        <p:txBody>
+          <a:bodyPr rtlCol="0" anchor="ctr"/>
+          <a:lstStyle/>
+          <a:p>
+            <a:pPr algn="ctr"/>
+            <a:r>
+              <a:rPr lang="de-DE" sz="800" dirty="0" err="1"/>
+              <a:t>Conv</a:t>
+            </a:r>
+            <a:endParaRPr lang="de-DE" sz="800" dirty="0"/>
+          </a:p>
+          <a:p>
+            <a:pPr algn="ctr"/>
+            <a:r>
+              <a:rPr lang="de-DE" sz="800" dirty="0"/>
+              <a:t>3x3, </a:t>
+            </a:r>
+          </a:p>
+          <a:p>
+            <a:pPr algn="ctr"/>
+            <a:r>
+              <a:rPr lang="de-DE" sz="800" dirty="0"/>
+              <a:t>Filter=192, </a:t>
+            </a:r>
+            <a:r>
+              <a:rPr lang="de-DE" sz="800" dirty="0" err="1"/>
+              <a:t>strides</a:t>
+            </a:r>
+            <a:r>
+              <a:rPr lang="de-DE" sz="800" dirty="0"/>
+              <a:t>=2</a:t>
+            </a:r>
+            <a:endParaRPr lang="de-DE" sz="1000" dirty="0"/>
+          </a:p>
+        </p:txBody>
+      </p:sp>
+      <p:cxnSp>
+        <p:nvCxnSpPr>
+          <p:cNvPr id="22" name="Gerade Verbindung mit Pfeil 21">
+            <a:extLst>
+              <a:ext uri="{FF2B5EF4-FFF2-40B4-BE49-F238E27FC236}">
+                <a16:creationId xmlns:a16="http://schemas.microsoft.com/office/drawing/2014/main" id="{0756B193-1048-4FDB-BE5A-17708AC9B053}"/>
+              </a:ext>
+            </a:extLst>
+          </p:cNvPr>
+          <p:cNvCxnSpPr>
+            <a:cxnSpLocks/>
+            <a:endCxn id="21" idx="1"/>
+          </p:cNvCxnSpPr>
+          <p:nvPr/>
+        </p:nvCxnSpPr>
+        <p:spPr>
+          <a:xfrm>
+            <a:off x="4881798" y="2550260"/>
+            <a:ext cx="670711" cy="0"/>
+          </a:xfrm>
+          <a:prstGeom prst="straightConnector1">
+            <a:avLst/>
+          </a:prstGeom>
+          <a:ln>
+            <a:tailEnd type="triangle"/>
+          </a:ln>
+        </p:spPr>
+        <p:style>
+          <a:lnRef idx="1">
+            <a:schemeClr val="accent1"/>
+          </a:lnRef>
+          <a:fillRef idx="0">
+            <a:schemeClr val="accent1"/>
+          </a:fillRef>
+          <a:effectRef idx="0">
+            <a:schemeClr val="accent1"/>
+          </a:effectRef>
+          <a:fontRef idx="minor">
+            <a:schemeClr val="tx1"/>
+          </a:fontRef>
+        </p:style>
+      </p:cxnSp>
+      <p:sp>
+        <p:nvSpPr>
+          <p:cNvPr id="23" name="Textfeld 22">
+            <a:extLst>
+              <a:ext uri="{FF2B5EF4-FFF2-40B4-BE49-F238E27FC236}">
+                <a16:creationId xmlns:a16="http://schemas.microsoft.com/office/drawing/2014/main" id="{278307A7-28C7-4DAC-B78B-9B05CCE50BAB}"/>
+              </a:ext>
+            </a:extLst>
+          </p:cNvPr>
+          <p:cNvSpPr txBox="1"/>
+          <p:nvPr/>
+        </p:nvSpPr>
+        <p:spPr>
+          <a:xfrm>
+            <a:off x="4819446" y="2565547"/>
+            <a:ext cx="795411" cy="230832"/>
+          </a:xfrm>
+          <a:prstGeom prst="rect">
+            <a:avLst/>
+          </a:prstGeom>
+          <a:noFill/>
+        </p:spPr>
+        <p:txBody>
+          <a:bodyPr wrap="none" rtlCol="0">
+            <a:spAutoFit/>
+          </a:bodyPr>
+          <a:lstStyle/>
+          <a:p>
+            <a:r>
+              <a:rPr lang="de-DE" sz="900" dirty="0"/>
+              <a:t>8x41x41x192</a:t>
+            </a:r>
+          </a:p>
+        </p:txBody>
+      </p:sp>
+      <p:sp>
+        <p:nvSpPr>
+          <p:cNvPr id="24" name="Rechteck 23">
+            <a:extLst>
+              <a:ext uri="{FF2B5EF4-FFF2-40B4-BE49-F238E27FC236}">
+                <a16:creationId xmlns:a16="http://schemas.microsoft.com/office/drawing/2014/main" id="{6E1CCF2C-1F72-4881-AE9E-1FD0C5E1E3E5}"/>
+              </a:ext>
+            </a:extLst>
+          </p:cNvPr>
+          <p:cNvSpPr/>
+          <p:nvPr/>
+        </p:nvSpPr>
+        <p:spPr>
+          <a:xfrm>
+            <a:off x="2247247" y="3212745"/>
+            <a:ext cx="981920" cy="482048"/>
+          </a:xfrm>
+          <a:prstGeom prst="rect">
+            <a:avLst/>
+          </a:prstGeom>
+          <a:solidFill>
+            <a:schemeClr val="accent4">
+              <a:lumMod val="75000"/>
+            </a:schemeClr>
+          </a:solidFill>
+        </p:spPr>
+        <p:style>
+          <a:lnRef idx="2">
+            <a:schemeClr val="accent1">
+              <a:shade val="50000"/>
+            </a:schemeClr>
+          </a:lnRef>
+          <a:fillRef idx="1">
+            <a:schemeClr val="accent1"/>
+          </a:fillRef>
+          <a:effectRef idx="0">
+            <a:schemeClr val="accent1"/>
+          </a:effectRef>
+          <a:fontRef idx="minor">
+            <a:schemeClr val="lt1"/>
+          </a:fontRef>
+        </p:style>
+        <p:txBody>
+          <a:bodyPr rtlCol="0" anchor="ctr"/>
+          <a:lstStyle/>
+          <a:p>
+            <a:pPr algn="ctr"/>
+            <a:r>
+              <a:rPr lang="de-DE" sz="800" dirty="0" err="1"/>
+              <a:t>Conv</a:t>
+            </a:r>
+            <a:endParaRPr lang="de-DE" sz="800" dirty="0"/>
+          </a:p>
+          <a:p>
+            <a:pPr algn="ctr"/>
+            <a:r>
+              <a:rPr lang="de-DE" sz="800" dirty="0"/>
+              <a:t>3x3, </a:t>
+            </a:r>
+          </a:p>
+          <a:p>
+            <a:pPr algn="ctr"/>
+            <a:r>
+              <a:rPr lang="de-DE" sz="800" dirty="0"/>
+              <a:t>Filter=192 </a:t>
+            </a:r>
+            <a:r>
+              <a:rPr lang="de-DE" sz="800" dirty="0" err="1"/>
+              <a:t>padding</a:t>
+            </a:r>
+            <a:r>
+              <a:rPr lang="de-DE" sz="800" dirty="0"/>
+              <a:t>=SAME</a:t>
+            </a:r>
+            <a:endParaRPr lang="de-DE" sz="1000" dirty="0"/>
+          </a:p>
+        </p:txBody>
+      </p:sp>
+      <p:sp>
+        <p:nvSpPr>
+          <p:cNvPr id="28" name="Rechteck 27">
+            <a:extLst>
+              <a:ext uri="{FF2B5EF4-FFF2-40B4-BE49-F238E27FC236}">
+                <a16:creationId xmlns:a16="http://schemas.microsoft.com/office/drawing/2014/main" id="{2A991C58-35FD-4E37-ADC3-E4E66B321D0B}"/>
+              </a:ext>
+            </a:extLst>
+          </p:cNvPr>
+          <p:cNvSpPr/>
+          <p:nvPr/>
+        </p:nvSpPr>
+        <p:spPr>
+          <a:xfrm>
+            <a:off x="3899878" y="3219035"/>
+            <a:ext cx="981920" cy="482048"/>
+          </a:xfrm>
+          <a:prstGeom prst="rect">
+            <a:avLst/>
+          </a:prstGeom>
+          <a:solidFill>
+            <a:schemeClr val="accent4">
+              <a:lumMod val="75000"/>
+            </a:schemeClr>
+          </a:solidFill>
+        </p:spPr>
+        <p:style>
+          <a:lnRef idx="2">
+            <a:schemeClr val="accent1">
+              <a:shade val="50000"/>
+            </a:schemeClr>
+          </a:lnRef>
+          <a:fillRef idx="1">
+            <a:schemeClr val="accent1"/>
+          </a:fillRef>
+          <a:effectRef idx="0">
+            <a:schemeClr val="accent1"/>
+          </a:effectRef>
+          <a:fontRef idx="minor">
+            <a:schemeClr val="lt1"/>
+          </a:fontRef>
+        </p:style>
+        <p:txBody>
+          <a:bodyPr rtlCol="0" anchor="ctr"/>
+          <a:lstStyle/>
+          <a:p>
+            <a:pPr algn="ctr"/>
+            <a:r>
+              <a:rPr lang="de-DE" sz="800" dirty="0" err="1"/>
+              <a:t>Conv</a:t>
+            </a:r>
+            <a:endParaRPr lang="de-DE" sz="800" dirty="0"/>
+          </a:p>
+          <a:p>
+            <a:pPr algn="ctr"/>
+            <a:r>
+              <a:rPr lang="de-DE" sz="800" dirty="0"/>
+              <a:t>1x1, </a:t>
+            </a:r>
+          </a:p>
+          <a:p>
+            <a:pPr algn="ctr"/>
+            <a:r>
+              <a:rPr lang="de-DE" sz="800" dirty="0"/>
+              <a:t>Filter=192</a:t>
+            </a:r>
+            <a:endParaRPr lang="de-DE" sz="1000" dirty="0"/>
+          </a:p>
+        </p:txBody>
+      </p:sp>
+      <p:sp>
+        <p:nvSpPr>
+          <p:cNvPr id="29" name="Rechteck 28">
+            <a:extLst>
+              <a:ext uri="{FF2B5EF4-FFF2-40B4-BE49-F238E27FC236}">
+                <a16:creationId xmlns:a16="http://schemas.microsoft.com/office/drawing/2014/main" id="{DCEE7935-F424-4F75-A3AD-CB7EE169140B}"/>
+              </a:ext>
+            </a:extLst>
+          </p:cNvPr>
+          <p:cNvSpPr/>
+          <p:nvPr/>
+        </p:nvSpPr>
+        <p:spPr>
+          <a:xfrm>
+            <a:off x="5552509" y="3210795"/>
+            <a:ext cx="981920" cy="482048"/>
+          </a:xfrm>
+          <a:prstGeom prst="rect">
+            <a:avLst/>
+          </a:prstGeom>
+          <a:solidFill>
+            <a:schemeClr val="accent4">
+              <a:lumMod val="75000"/>
+            </a:schemeClr>
+          </a:solidFill>
+        </p:spPr>
+        <p:style>
+          <a:lnRef idx="2">
+            <a:schemeClr val="accent1">
+              <a:shade val="50000"/>
+            </a:schemeClr>
+          </a:lnRef>
+          <a:fillRef idx="1">
+            <a:schemeClr val="accent1"/>
+          </a:fillRef>
+          <a:effectRef idx="0">
+            <a:schemeClr val="accent1"/>
+          </a:effectRef>
+          <a:fontRef idx="minor">
+            <a:schemeClr val="lt1"/>
+          </a:fontRef>
+        </p:style>
+        <p:txBody>
+          <a:bodyPr rtlCol="0" anchor="ctr"/>
+          <a:lstStyle/>
+          <a:p>
+            <a:pPr algn="ctr"/>
+            <a:r>
+              <a:rPr lang="de-DE" sz="800" dirty="0" err="1"/>
+              <a:t>Conv</a:t>
+            </a:r>
+            <a:endParaRPr lang="de-DE" sz="800" dirty="0"/>
+          </a:p>
+          <a:p>
+            <a:pPr algn="ctr"/>
+            <a:r>
+              <a:rPr lang="de-DE" sz="800" dirty="0"/>
+              <a:t>1x1, </a:t>
+            </a:r>
+          </a:p>
+          <a:p>
+            <a:pPr algn="ctr"/>
+            <a:r>
+              <a:rPr lang="de-DE" sz="800" dirty="0"/>
+              <a:t>Filter=10</a:t>
+            </a:r>
+            <a:endParaRPr lang="de-DE" sz="1000" dirty="0"/>
+          </a:p>
+        </p:txBody>
+      </p:sp>
+      <p:sp>
+        <p:nvSpPr>
+          <p:cNvPr id="30" name="Rechteck 29">
+            <a:extLst>
+              <a:ext uri="{FF2B5EF4-FFF2-40B4-BE49-F238E27FC236}">
+                <a16:creationId xmlns:a16="http://schemas.microsoft.com/office/drawing/2014/main" id="{7CC1A265-D9FA-44CC-8D9A-E942A4B5D9C8}"/>
+              </a:ext>
+            </a:extLst>
+          </p:cNvPr>
+          <p:cNvSpPr/>
+          <p:nvPr/>
+        </p:nvSpPr>
+        <p:spPr>
+          <a:xfrm>
+            <a:off x="2247247" y="4123739"/>
+            <a:ext cx="981920" cy="482048"/>
+          </a:xfrm>
+          <a:prstGeom prst="rect">
+            <a:avLst/>
+          </a:prstGeom>
+          <a:solidFill>
+            <a:srgbClr val="00B050"/>
+          </a:solidFill>
+        </p:spPr>
+        <p:style>
+          <a:lnRef idx="2">
+            <a:schemeClr val="accent1">
+              <a:shade val="50000"/>
+            </a:schemeClr>
+          </a:lnRef>
+          <a:fillRef idx="1">
+            <a:schemeClr val="accent1"/>
+          </a:fillRef>
+          <a:effectRef idx="0">
+            <a:schemeClr val="accent1"/>
+          </a:effectRef>
+          <a:fontRef idx="minor">
+            <a:schemeClr val="lt1"/>
+          </a:fontRef>
+        </p:style>
+        <p:txBody>
+          <a:bodyPr rtlCol="0" anchor="ctr"/>
+          <a:lstStyle/>
+          <a:p>
+            <a:pPr algn="ctr"/>
+            <a:r>
+              <a:rPr lang="de-DE" sz="800" dirty="0"/>
+              <a:t>Average Pool</a:t>
+            </a:r>
+          </a:p>
+          <a:p>
+            <a:pPr algn="ctr"/>
+            <a:r>
+              <a:rPr lang="de-DE" sz="800" dirty="0"/>
+              <a:t>10x10 s=10,10</a:t>
+            </a:r>
+          </a:p>
+        </p:txBody>
+      </p:sp>
+      <p:sp>
+        <p:nvSpPr>
+          <p:cNvPr id="31" name="Rechteck 30">
+            <a:extLst>
+              <a:ext uri="{FF2B5EF4-FFF2-40B4-BE49-F238E27FC236}">
+                <a16:creationId xmlns:a16="http://schemas.microsoft.com/office/drawing/2014/main" id="{3A8245BA-DB2A-48C2-9FAF-4491CF45760A}"/>
+              </a:ext>
+            </a:extLst>
+          </p:cNvPr>
+          <p:cNvSpPr/>
+          <p:nvPr/>
+        </p:nvSpPr>
+        <p:spPr>
+          <a:xfrm>
+            <a:off x="3899878" y="4123739"/>
+            <a:ext cx="981920" cy="482048"/>
+          </a:xfrm>
+          <a:prstGeom prst="rect">
+            <a:avLst/>
+          </a:prstGeom>
+          <a:solidFill>
+            <a:srgbClr val="00B0F0"/>
+          </a:solidFill>
+        </p:spPr>
+        <p:style>
+          <a:lnRef idx="2">
+            <a:schemeClr val="accent1">
+              <a:shade val="50000"/>
+            </a:schemeClr>
+          </a:lnRef>
+          <a:fillRef idx="1">
+            <a:schemeClr val="accent1"/>
+          </a:fillRef>
+          <a:effectRef idx="0">
+            <a:schemeClr val="accent1"/>
+          </a:effectRef>
+          <a:fontRef idx="minor">
+            <a:schemeClr val="lt1"/>
+          </a:fontRef>
+        </p:style>
+        <p:txBody>
+          <a:bodyPr rtlCol="0" anchor="ctr"/>
+          <a:lstStyle/>
+          <a:p>
+            <a:pPr algn="ctr"/>
+            <a:r>
+              <a:rPr lang="de-DE" sz="800" dirty="0"/>
+              <a:t>Ausgabe Layer</a:t>
+            </a:r>
+          </a:p>
+          <a:p>
+            <a:pPr algn="ctr"/>
+            <a:r>
+              <a:rPr lang="de-DE" sz="800" dirty="0"/>
+              <a:t>3 Units</a:t>
+            </a:r>
+          </a:p>
+        </p:txBody>
+      </p:sp>
+      <mc:AlternateContent xmlns:mc="http://schemas.openxmlformats.org/markup-compatibility/2006" xmlns:a14="http://schemas.microsoft.com/office/drawing/2010/main">
+        <mc:Choice Requires="a14">
+          <p:sp>
+            <p:nvSpPr>
+              <p:cNvPr id="33" name="Textfeld 32">
+                <a:extLst>
+                  <a:ext uri="{FF2B5EF4-FFF2-40B4-BE49-F238E27FC236}">
+                    <a16:creationId xmlns:a16="http://schemas.microsoft.com/office/drawing/2014/main" id="{AB30D050-1C4B-4D5E-B601-8939EDF22C85}"/>
+                  </a:ext>
+                </a:extLst>
+              </p:cNvPr>
+              <p:cNvSpPr txBox="1"/>
+              <p:nvPr/>
+            </p:nvSpPr>
+            <p:spPr>
+              <a:xfrm>
+                <a:off x="5954454" y="3997867"/>
+                <a:ext cx="283091" cy="733791"/>
+              </a:xfrm>
+              <a:prstGeom prst="rect">
+                <a:avLst/>
+              </a:prstGeom>
+              <a:noFill/>
+            </p:spPr>
+            <p:txBody>
+              <a:bodyPr wrap="none" lIns="0" tIns="0" rIns="0" bIns="0" rtlCol="0">
+                <a:spAutoFit/>
+              </a:bodyPr>
+              <a:lstStyle/>
+              <a:p>
+                <a:pPr/>
+                <a14:m>
+                  <m:oMathPara xmlns:m="http://schemas.openxmlformats.org/officeDocument/2006/math">
+                    <m:oMathParaPr>
+                      <m:jc m:val="centerGroup"/>
+                    </m:oMathParaPr>
+                    <m:oMath xmlns:m="http://schemas.openxmlformats.org/officeDocument/2006/math">
+                      <m:m>
+                        <m:mPr>
+                          <m:mcs>
+                            <m:mc>
+                              <m:mcPr>
+                                <m:count m:val="1"/>
+                                <m:mcJc m:val="center"/>
+                              </m:mcPr>
+                            </m:mc>
+                          </m:mcs>
+                          <m:ctrlPr>
+                            <a:rPr lang="de-DE" i="1" smtClean="0">
+                              <a:latin typeface="Cambria Math" panose="02040503050406030204" pitchFamily="18" charset="0"/>
+                            </a:rPr>
+                          </m:ctrlPr>
+                        </m:mPr>
+                        <m:mr>
+                          <m:e>
+                            <m:sSub>
+                              <m:sSubPr>
+                                <m:ctrlPr>
+                                  <a:rPr lang="de-DE" b="0" i="1" smtClean="0">
+                                    <a:latin typeface="Cambria Math" panose="02040503050406030204" pitchFamily="18" charset="0"/>
+                                  </a:rPr>
+                                </m:ctrlPr>
+                              </m:sSubPr>
+                              <m:e>
+                                <m:r>
+                                  <a:rPr lang="de-DE" b="0" i="1" smtClean="0">
+                                    <a:latin typeface="Cambria Math" panose="02040503050406030204" pitchFamily="18" charset="0"/>
+                                  </a:rPr>
+                                  <m:t>𝑦</m:t>
+                                </m:r>
+                              </m:e>
+                              <m:sub>
+                                <m:r>
+                                  <a:rPr lang="de-DE" b="0" i="1" smtClean="0">
+                                    <a:latin typeface="Cambria Math" panose="02040503050406030204" pitchFamily="18" charset="0"/>
+                                  </a:rPr>
+                                  <m:t>1</m:t>
+                                </m:r>
+                              </m:sub>
+                            </m:sSub>
+                          </m:e>
+                        </m:mr>
+                        <m:mr>
+                          <m:e>
+                            <m:sSub>
+                              <m:sSubPr>
+                                <m:ctrlPr>
+                                  <a:rPr lang="de-DE" i="1" smtClean="0">
+                                    <a:latin typeface="Cambria Math" panose="02040503050406030204" pitchFamily="18" charset="0"/>
+                                  </a:rPr>
+                                </m:ctrlPr>
+                              </m:sSubPr>
+                              <m:e>
+                                <m:r>
+                                  <a:rPr lang="de-DE" b="0" i="1" smtClean="0">
+                                    <a:latin typeface="Cambria Math" panose="02040503050406030204" pitchFamily="18" charset="0"/>
+                                  </a:rPr>
+                                  <m:t>𝑦</m:t>
+                                </m:r>
+                              </m:e>
+                              <m:sub>
+                                <m:r>
+                                  <a:rPr lang="de-DE" b="0" i="1" smtClean="0">
+                                    <a:latin typeface="Cambria Math" panose="02040503050406030204" pitchFamily="18" charset="0"/>
+                                  </a:rPr>
+                                  <m:t>2</m:t>
+                                </m:r>
+                              </m:sub>
+                            </m:sSub>
+                          </m:e>
+                        </m:mr>
+                        <m:mr>
+                          <m:e>
+                            <m:sSub>
+                              <m:sSubPr>
+                                <m:ctrlPr>
+                                  <a:rPr lang="de-DE" i="1" smtClean="0">
+                                    <a:latin typeface="Cambria Math" panose="02040503050406030204" pitchFamily="18" charset="0"/>
+                                  </a:rPr>
+                                </m:ctrlPr>
+                              </m:sSubPr>
+                              <m:e>
+                                <m:r>
+                                  <a:rPr lang="de-DE" b="0" i="1" smtClean="0">
+                                    <a:latin typeface="Cambria Math" panose="02040503050406030204" pitchFamily="18" charset="0"/>
+                                  </a:rPr>
+                                  <m:t>𝑦</m:t>
+                                </m:r>
+                              </m:e>
+                              <m:sub>
+                                <m:r>
+                                  <a:rPr lang="de-DE" b="0" i="1" smtClean="0">
+                                    <a:latin typeface="Cambria Math" panose="02040503050406030204" pitchFamily="18" charset="0"/>
+                                  </a:rPr>
+                                  <m:t>3</m:t>
+                                </m:r>
+                              </m:sub>
+                            </m:sSub>
+                          </m:e>
+                        </m:mr>
+                      </m:m>
+                    </m:oMath>
+                  </m:oMathPara>
+                </a14:m>
+                <a:endParaRPr lang="de-DE" dirty="0"/>
+              </a:p>
+            </p:txBody>
+          </p:sp>
+        </mc:Choice>
+        <mc:Fallback xmlns="">
+          <p:sp>
+            <p:nvSpPr>
+              <p:cNvPr id="33" name="Textfeld 32">
+                <a:extLst>
+                  <a:ext uri="{FF2B5EF4-FFF2-40B4-BE49-F238E27FC236}">
+                    <a16:creationId xmlns:a16="http://schemas.microsoft.com/office/drawing/2014/main" id="{AB30D050-1C4B-4D5E-B601-8939EDF22C85}"/>
+                  </a:ext>
+                </a:extLst>
+              </p:cNvPr>
+              <p:cNvSpPr txBox="1">
+                <a:spLocks noRot="1" noChangeAspect="1" noMove="1" noResize="1" noEditPoints="1" noAdjustHandles="1" noChangeArrowheads="1" noChangeShapeType="1" noTextEdit="1"/>
+              </p:cNvSpPr>
+              <p:nvPr/>
+            </p:nvSpPr>
+            <p:spPr>
+              <a:xfrm>
+                <a:off x="5954454" y="3997867"/>
+                <a:ext cx="283091" cy="733791"/>
+              </a:xfrm>
+              <a:prstGeom prst="rect">
+                <a:avLst/>
+              </a:prstGeom>
+              <a:blipFill>
+                <a:blip r:embed="rId2"/>
+                <a:stretch>
+                  <a:fillRect/>
+                </a:stretch>
+              </a:blipFill>
+            </p:spPr>
+            <p:txBody>
+              <a:bodyPr/>
+              <a:lstStyle/>
+              <a:p>
+                <a:r>
+                  <a:rPr lang="de-DE">
+                    <a:noFill/>
+                  </a:rPr>
+                  <a:t> </a:t>
+                </a:r>
+              </a:p>
+            </p:txBody>
+          </p:sp>
+        </mc:Fallback>
+      </mc:AlternateContent>
+      <p:cxnSp>
+        <p:nvCxnSpPr>
+          <p:cNvPr id="35" name="Verbinder: gewinkelt 34">
+            <a:extLst>
+              <a:ext uri="{FF2B5EF4-FFF2-40B4-BE49-F238E27FC236}">
+                <a16:creationId xmlns:a16="http://schemas.microsoft.com/office/drawing/2014/main" id="{D4C7F9E5-4E2C-4338-A8F7-2371DEE2771B}"/>
+              </a:ext>
+            </a:extLst>
+          </p:cNvPr>
+          <p:cNvCxnSpPr>
+            <a:cxnSpLocks/>
+            <a:stCxn id="14" idx="3"/>
+            <a:endCxn id="17" idx="1"/>
+          </p:cNvCxnSpPr>
+          <p:nvPr/>
+        </p:nvCxnSpPr>
+        <p:spPr>
+          <a:xfrm flipH="1">
+            <a:off x="2247246" y="1643606"/>
+            <a:ext cx="4287183" cy="906654"/>
+          </a:xfrm>
+          <a:prstGeom prst="bentConnector5">
+            <a:avLst>
+              <a:gd name="adj1" fmla="val -5332"/>
+              <a:gd name="adj2" fmla="val 50000"/>
+              <a:gd name="adj3" fmla="val 115301"/>
+            </a:avLst>
+          </a:prstGeom>
+          <a:ln>
+            <a:tailEnd type="triangle"/>
+          </a:ln>
+        </p:spPr>
+        <p:style>
+          <a:lnRef idx="1">
+            <a:schemeClr val="accent1"/>
+          </a:lnRef>
+          <a:fillRef idx="0">
+            <a:schemeClr val="accent1"/>
+          </a:fillRef>
+          <a:effectRef idx="0">
+            <a:schemeClr val="accent1"/>
+          </a:effectRef>
+          <a:fontRef idx="minor">
+            <a:schemeClr val="tx1"/>
+          </a:fontRef>
+        </p:style>
+      </p:cxnSp>
+      <p:sp>
+        <p:nvSpPr>
+          <p:cNvPr id="38" name="Textfeld 37">
+            <a:extLst>
+              <a:ext uri="{FF2B5EF4-FFF2-40B4-BE49-F238E27FC236}">
+                <a16:creationId xmlns:a16="http://schemas.microsoft.com/office/drawing/2014/main" id="{9318D646-238E-4A42-9983-0D0CD6BC6851}"/>
+              </a:ext>
+            </a:extLst>
+          </p:cNvPr>
+          <p:cNvSpPr txBox="1"/>
+          <p:nvPr/>
+        </p:nvSpPr>
+        <p:spPr>
+          <a:xfrm>
+            <a:off x="1571895" y="2563597"/>
+            <a:ext cx="737702" cy="230832"/>
+          </a:xfrm>
+          <a:prstGeom prst="rect">
+            <a:avLst/>
+          </a:prstGeom>
+          <a:noFill/>
+        </p:spPr>
+        <p:txBody>
+          <a:bodyPr wrap="none" rtlCol="0">
+            <a:spAutoFit/>
+          </a:bodyPr>
+          <a:lstStyle/>
+          <a:p>
+            <a:r>
+              <a:rPr lang="de-DE" sz="900" dirty="0"/>
+              <a:t>8x41x41x96</a:t>
+            </a:r>
+          </a:p>
+        </p:txBody>
+      </p:sp>
+      <p:cxnSp>
+        <p:nvCxnSpPr>
+          <p:cNvPr id="40" name="Verbinder: gewinkelt 39">
+            <a:extLst>
+              <a:ext uri="{FF2B5EF4-FFF2-40B4-BE49-F238E27FC236}">
+                <a16:creationId xmlns:a16="http://schemas.microsoft.com/office/drawing/2014/main" id="{2705DD2D-65AA-47DB-BFBC-353533B88900}"/>
+              </a:ext>
+            </a:extLst>
+          </p:cNvPr>
+          <p:cNvCxnSpPr>
+            <a:cxnSpLocks/>
+            <a:stCxn id="21" idx="3"/>
+            <a:endCxn id="24" idx="1"/>
+          </p:cNvCxnSpPr>
+          <p:nvPr/>
+        </p:nvCxnSpPr>
+        <p:spPr>
+          <a:xfrm flipH="1">
+            <a:off x="2247247" y="2550260"/>
+            <a:ext cx="4287182" cy="903509"/>
+          </a:xfrm>
+          <a:prstGeom prst="bentConnector5">
+            <a:avLst>
+              <a:gd name="adj1" fmla="val -5332"/>
+              <a:gd name="adj2" fmla="val 50000"/>
+              <a:gd name="adj3" fmla="val 115765"/>
+            </a:avLst>
+          </a:prstGeom>
+          <a:ln>
+            <a:tailEnd type="triangle"/>
+          </a:ln>
+        </p:spPr>
+        <p:style>
+          <a:lnRef idx="1">
+            <a:schemeClr val="accent1"/>
+          </a:lnRef>
+          <a:fillRef idx="0">
+            <a:schemeClr val="accent1"/>
+          </a:fillRef>
+          <a:effectRef idx="0">
+            <a:schemeClr val="accent1"/>
+          </a:effectRef>
+          <a:fontRef idx="minor">
+            <a:schemeClr val="tx1"/>
+          </a:fontRef>
+        </p:style>
+      </p:cxnSp>
+      <p:sp>
+        <p:nvSpPr>
+          <p:cNvPr id="43" name="Textfeld 42">
+            <a:extLst>
+              <a:ext uri="{FF2B5EF4-FFF2-40B4-BE49-F238E27FC236}">
+                <a16:creationId xmlns:a16="http://schemas.microsoft.com/office/drawing/2014/main" id="{F18DBE3A-68B7-4C08-A7F9-988A16E72373}"/>
+              </a:ext>
+            </a:extLst>
+          </p:cNvPr>
+          <p:cNvSpPr txBox="1"/>
+          <p:nvPr/>
+        </p:nvSpPr>
+        <p:spPr>
+          <a:xfrm>
+            <a:off x="1543040" y="3451819"/>
+            <a:ext cx="795411" cy="230832"/>
+          </a:xfrm>
+          <a:prstGeom prst="rect">
+            <a:avLst/>
+          </a:prstGeom>
+          <a:noFill/>
+        </p:spPr>
+        <p:txBody>
+          <a:bodyPr wrap="none" rtlCol="0">
+            <a:spAutoFit/>
+          </a:bodyPr>
+          <a:lstStyle/>
+          <a:p>
+            <a:r>
+              <a:rPr lang="de-DE" sz="900" dirty="0"/>
+              <a:t>8x20x20x192</a:t>
+            </a:r>
+          </a:p>
+        </p:txBody>
+      </p:sp>
+      <p:cxnSp>
+        <p:nvCxnSpPr>
+          <p:cNvPr id="45" name="Gerade Verbindung mit Pfeil 44">
+            <a:extLst>
+              <a:ext uri="{FF2B5EF4-FFF2-40B4-BE49-F238E27FC236}">
+                <a16:creationId xmlns:a16="http://schemas.microsoft.com/office/drawing/2014/main" id="{C051C01C-B8FA-48EE-B586-0697CDA98E4D}"/>
+              </a:ext>
+            </a:extLst>
+          </p:cNvPr>
+          <p:cNvCxnSpPr>
+            <a:cxnSpLocks/>
+            <a:endCxn id="28" idx="1"/>
+          </p:cNvCxnSpPr>
+          <p:nvPr/>
+        </p:nvCxnSpPr>
+        <p:spPr>
+          <a:xfrm>
+            <a:off x="3229166" y="3460059"/>
+            <a:ext cx="670712" cy="0"/>
+          </a:xfrm>
+          <a:prstGeom prst="straightConnector1">
+            <a:avLst/>
+          </a:prstGeom>
+          <a:ln>
+            <a:tailEnd type="triangle"/>
+          </a:ln>
+        </p:spPr>
+        <p:style>
+          <a:lnRef idx="1">
+            <a:schemeClr val="accent1"/>
+          </a:lnRef>
+          <a:fillRef idx="0">
+            <a:schemeClr val="accent1"/>
+          </a:fillRef>
+          <a:effectRef idx="0">
+            <a:schemeClr val="accent1"/>
+          </a:effectRef>
+          <a:fontRef idx="minor">
+            <a:schemeClr val="tx1"/>
+          </a:fontRef>
+        </p:style>
+      </p:cxnSp>
+      <p:cxnSp>
+        <p:nvCxnSpPr>
+          <p:cNvPr id="48" name="Gerade Verbindung mit Pfeil 47">
+            <a:extLst>
+              <a:ext uri="{FF2B5EF4-FFF2-40B4-BE49-F238E27FC236}">
+                <a16:creationId xmlns:a16="http://schemas.microsoft.com/office/drawing/2014/main" id="{6C0C2ED6-ACFB-4E18-9E73-E31CCF314199}"/>
+              </a:ext>
+            </a:extLst>
+          </p:cNvPr>
+          <p:cNvCxnSpPr>
+            <a:cxnSpLocks/>
+            <a:stCxn id="28" idx="3"/>
+            <a:endCxn id="29" idx="1"/>
+          </p:cNvCxnSpPr>
+          <p:nvPr/>
+        </p:nvCxnSpPr>
+        <p:spPr>
+          <a:xfrm flipV="1">
+            <a:off x="4881798" y="3451819"/>
+            <a:ext cx="670711" cy="8240"/>
+          </a:xfrm>
+          <a:prstGeom prst="straightConnector1">
+            <a:avLst/>
+          </a:prstGeom>
+          <a:ln>
+            <a:tailEnd type="triangle"/>
+          </a:ln>
+        </p:spPr>
+        <p:style>
+          <a:lnRef idx="1">
+            <a:schemeClr val="accent1"/>
+          </a:lnRef>
+          <a:fillRef idx="0">
+            <a:schemeClr val="accent1"/>
+          </a:fillRef>
+          <a:effectRef idx="0">
+            <a:schemeClr val="accent1"/>
+          </a:effectRef>
+          <a:fontRef idx="minor">
+            <a:schemeClr val="tx1"/>
+          </a:fontRef>
+        </p:style>
+      </p:cxnSp>
+      <p:cxnSp>
+        <p:nvCxnSpPr>
+          <p:cNvPr id="51" name="Verbinder: gewinkelt 50">
+            <a:extLst>
+              <a:ext uri="{FF2B5EF4-FFF2-40B4-BE49-F238E27FC236}">
+                <a16:creationId xmlns:a16="http://schemas.microsoft.com/office/drawing/2014/main" id="{9CFA4D10-275D-4CC7-B5FB-C9FF26D7D5F5}"/>
+              </a:ext>
+            </a:extLst>
+          </p:cNvPr>
+          <p:cNvCxnSpPr>
+            <a:cxnSpLocks/>
+            <a:stCxn id="29" idx="3"/>
+            <a:endCxn id="30" idx="1"/>
+          </p:cNvCxnSpPr>
+          <p:nvPr/>
+        </p:nvCxnSpPr>
+        <p:spPr>
+          <a:xfrm flipH="1">
+            <a:off x="2247247" y="3451819"/>
+            <a:ext cx="4287182" cy="912944"/>
+          </a:xfrm>
+          <a:prstGeom prst="bentConnector5">
+            <a:avLst>
+              <a:gd name="adj1" fmla="val -5332"/>
+              <a:gd name="adj2" fmla="val 50000"/>
+              <a:gd name="adj3" fmla="val 115996"/>
+            </a:avLst>
+          </a:prstGeom>
+          <a:ln>
+            <a:tailEnd type="triangle"/>
+          </a:ln>
+        </p:spPr>
+        <p:style>
+          <a:lnRef idx="1">
+            <a:schemeClr val="accent1"/>
+          </a:lnRef>
+          <a:fillRef idx="0">
+            <a:schemeClr val="accent1"/>
+          </a:fillRef>
+          <a:effectRef idx="0">
+            <a:schemeClr val="accent1"/>
+          </a:effectRef>
+          <a:fontRef idx="minor">
+            <a:schemeClr val="tx1"/>
+          </a:fontRef>
+        </p:style>
+      </p:cxnSp>
+      <p:sp>
+        <p:nvSpPr>
+          <p:cNvPr id="55" name="Textfeld 54">
+            <a:extLst>
+              <a:ext uri="{FF2B5EF4-FFF2-40B4-BE49-F238E27FC236}">
+                <a16:creationId xmlns:a16="http://schemas.microsoft.com/office/drawing/2014/main" id="{BA848606-39B9-47DA-9897-E06E4AA12143}"/>
+              </a:ext>
+            </a:extLst>
+          </p:cNvPr>
+          <p:cNvSpPr txBox="1"/>
+          <p:nvPr/>
+        </p:nvSpPr>
+        <p:spPr>
+          <a:xfrm>
+            <a:off x="3166815" y="3455721"/>
+            <a:ext cx="795411" cy="230832"/>
+          </a:xfrm>
+          <a:prstGeom prst="rect">
+            <a:avLst/>
+          </a:prstGeom>
+          <a:noFill/>
+        </p:spPr>
+        <p:txBody>
+          <a:bodyPr wrap="none" rtlCol="0">
+            <a:spAutoFit/>
+          </a:bodyPr>
+          <a:lstStyle/>
+          <a:p>
+            <a:r>
+              <a:rPr lang="de-DE" sz="900" dirty="0"/>
+              <a:t>8x20x20x192</a:t>
+            </a:r>
+          </a:p>
+        </p:txBody>
+      </p:sp>
+      <p:sp>
+        <p:nvSpPr>
+          <p:cNvPr id="56" name="Textfeld 55">
+            <a:extLst>
+              <a:ext uri="{FF2B5EF4-FFF2-40B4-BE49-F238E27FC236}">
+                <a16:creationId xmlns:a16="http://schemas.microsoft.com/office/drawing/2014/main" id="{7393614A-92F0-4A3C-AB49-2320C7380FCD}"/>
+              </a:ext>
+            </a:extLst>
+          </p:cNvPr>
+          <p:cNvSpPr txBox="1"/>
+          <p:nvPr/>
+        </p:nvSpPr>
+        <p:spPr>
+          <a:xfrm>
+            <a:off x="4817128" y="3458608"/>
+            <a:ext cx="795411" cy="230832"/>
+          </a:xfrm>
+          <a:prstGeom prst="rect">
+            <a:avLst/>
+          </a:prstGeom>
+          <a:noFill/>
+        </p:spPr>
+        <p:txBody>
+          <a:bodyPr wrap="none" rtlCol="0">
+            <a:spAutoFit/>
+          </a:bodyPr>
+          <a:lstStyle/>
+          <a:p>
+            <a:r>
+              <a:rPr lang="de-DE" sz="900" dirty="0"/>
+              <a:t>8x20x20x192</a:t>
+            </a:r>
+          </a:p>
+        </p:txBody>
+      </p:sp>
+      <p:sp>
+        <p:nvSpPr>
+          <p:cNvPr id="57" name="Textfeld 56">
+            <a:extLst>
+              <a:ext uri="{FF2B5EF4-FFF2-40B4-BE49-F238E27FC236}">
+                <a16:creationId xmlns:a16="http://schemas.microsoft.com/office/drawing/2014/main" id="{B750FD1F-ECA1-4B59-AC08-2C62CB7A8B6B}"/>
+              </a:ext>
+            </a:extLst>
+          </p:cNvPr>
+          <p:cNvSpPr txBox="1"/>
+          <p:nvPr/>
+        </p:nvSpPr>
+        <p:spPr>
+          <a:xfrm>
+            <a:off x="1543039" y="4372528"/>
+            <a:ext cx="737702" cy="230832"/>
+          </a:xfrm>
+          <a:prstGeom prst="rect">
+            <a:avLst/>
+          </a:prstGeom>
+          <a:noFill/>
+        </p:spPr>
+        <p:txBody>
+          <a:bodyPr wrap="none" rtlCol="0">
+            <a:spAutoFit/>
+          </a:bodyPr>
+          <a:lstStyle/>
+          <a:p>
+            <a:r>
+              <a:rPr lang="de-DE" sz="900" dirty="0"/>
+              <a:t>8x20x20x10</a:t>
+            </a:r>
+          </a:p>
+        </p:txBody>
+      </p:sp>
+      <p:cxnSp>
+        <p:nvCxnSpPr>
+          <p:cNvPr id="59" name="Gerade Verbindung mit Pfeil 58">
+            <a:extLst>
+              <a:ext uri="{FF2B5EF4-FFF2-40B4-BE49-F238E27FC236}">
+                <a16:creationId xmlns:a16="http://schemas.microsoft.com/office/drawing/2014/main" id="{331375D0-5BF2-4D0C-9CBB-C669B245E696}"/>
+              </a:ext>
+            </a:extLst>
+          </p:cNvPr>
+          <p:cNvCxnSpPr>
+            <a:cxnSpLocks/>
+            <a:stCxn id="30" idx="3"/>
+            <a:endCxn id="31" idx="1"/>
+          </p:cNvCxnSpPr>
+          <p:nvPr/>
+        </p:nvCxnSpPr>
+        <p:spPr>
+          <a:xfrm>
+            <a:off x="3229167" y="4364763"/>
+            <a:ext cx="670711" cy="0"/>
+          </a:xfrm>
+          <a:prstGeom prst="straightConnector1">
+            <a:avLst/>
+          </a:prstGeom>
+          <a:ln>
+            <a:tailEnd type="triangle"/>
+          </a:ln>
+        </p:spPr>
+        <p:style>
+          <a:lnRef idx="1">
+            <a:schemeClr val="accent1"/>
+          </a:lnRef>
+          <a:fillRef idx="0">
+            <a:schemeClr val="accent1"/>
+          </a:fillRef>
+          <a:effectRef idx="0">
+            <a:schemeClr val="accent1"/>
+          </a:effectRef>
+          <a:fontRef idx="minor">
+            <a:schemeClr val="tx1"/>
+          </a:fontRef>
+        </p:style>
+      </p:cxnSp>
+      <p:cxnSp>
+        <p:nvCxnSpPr>
+          <p:cNvPr id="62" name="Gerade Verbindung mit Pfeil 61">
+            <a:extLst>
+              <a:ext uri="{FF2B5EF4-FFF2-40B4-BE49-F238E27FC236}">
+                <a16:creationId xmlns:a16="http://schemas.microsoft.com/office/drawing/2014/main" id="{B2A60178-C0F5-4E92-B2CA-BCE51F3205F9}"/>
+              </a:ext>
+            </a:extLst>
+          </p:cNvPr>
+          <p:cNvCxnSpPr>
+            <a:cxnSpLocks/>
+            <a:stCxn id="31" idx="3"/>
+            <a:endCxn id="33" idx="1"/>
+          </p:cNvCxnSpPr>
+          <p:nvPr/>
+        </p:nvCxnSpPr>
+        <p:spPr>
+          <a:xfrm>
+            <a:off x="4881798" y="4364763"/>
+            <a:ext cx="1072656" cy="0"/>
+          </a:xfrm>
+          <a:prstGeom prst="straightConnector1">
+            <a:avLst/>
+          </a:prstGeom>
+          <a:ln>
+            <a:tailEnd type="triangle"/>
+          </a:ln>
+        </p:spPr>
+        <p:style>
+          <a:lnRef idx="1">
+            <a:schemeClr val="accent1"/>
+          </a:lnRef>
+          <a:fillRef idx="0">
+            <a:schemeClr val="accent1"/>
+          </a:fillRef>
+          <a:effectRef idx="0">
+            <a:schemeClr val="accent1"/>
+          </a:effectRef>
+          <a:fontRef idx="minor">
+            <a:schemeClr val="tx1"/>
+          </a:fontRef>
+        </p:style>
+      </p:cxnSp>
+      <p:sp>
+        <p:nvSpPr>
+          <p:cNvPr id="64" name="Textfeld 63">
+            <a:extLst>
+              <a:ext uri="{FF2B5EF4-FFF2-40B4-BE49-F238E27FC236}">
+                <a16:creationId xmlns:a16="http://schemas.microsoft.com/office/drawing/2014/main" id="{B7BE85D3-FCB4-4847-8ED2-CB9FDAC24CAE}"/>
+              </a:ext>
+            </a:extLst>
+          </p:cNvPr>
+          <p:cNvSpPr txBox="1"/>
+          <p:nvPr/>
+        </p:nvSpPr>
+        <p:spPr>
+          <a:xfrm>
+            <a:off x="3253379" y="4374955"/>
+            <a:ext cx="622286" cy="230832"/>
+          </a:xfrm>
+          <a:prstGeom prst="rect">
+            <a:avLst/>
+          </a:prstGeom>
+          <a:noFill/>
+        </p:spPr>
+        <p:txBody>
+          <a:bodyPr wrap="none" rtlCol="0">
+            <a:spAutoFit/>
+          </a:bodyPr>
+          <a:lstStyle/>
+          <a:p>
+            <a:r>
+              <a:rPr lang="de-DE" sz="900" dirty="0"/>
+              <a:t>8x2x2x10</a:t>
+            </a:r>
+          </a:p>
+        </p:txBody>
+      </p:sp>
+    </p:spTree>
+    <p:extLst>
+      <p:ext uri="{BB962C8B-B14F-4D97-AF65-F5344CB8AC3E}">
+        <p14:creationId xmlns:p14="http://schemas.microsoft.com/office/powerpoint/2010/main" val="1195220973"/>
       </p:ext>
     </p:extLst>
   </p:cSld>

</xml_diff>